<commit_message>
Updated the VRE figure and added it in the manuscript.
</commit_message>
<xml_diff>
--- a/Manuscript/Figures/VREs.pptx
+++ b/Manuscript/Figures/VREs.pptx
@@ -115,7 +115,7 @@
 <file path=ppt/revisionInfo.xml><?xml version="1.0" encoding="utf-8"?>
 <p1510:revInfo xmlns:a="http://schemas.openxmlformats.org/drawingml/2006/main" xmlns:r="http://schemas.openxmlformats.org/officeDocument/2006/relationships" xmlns:p1510="http://schemas.microsoft.com/office/powerpoint/2015/10/main">
   <p1510:revLst>
-    <p1510:client id="{EAF4CA26-18EA-4921-897C-5E539410CE2C}" v="7" dt="2022-07-20T10:55:51.647"/>
+    <p1510:client id="{86F396D1-7CDF-424C-B865-C984153A0302}" v="27" dt="2022-07-22T05:55:43.327"/>
   </p1510:revLst>
 </p1510:revInfo>
 </file>
@@ -535,6 +535,790 @@
             <ac:picMk id="457" creationId="{B29D4982-D8FD-4971-A744-99DFE46C9BEE}"/>
           </ac:picMkLst>
         </pc:picChg>
+      </pc:sldChg>
+    </pc:docChg>
+  </pc:docChgLst>
+  <pc:docChgLst>
+    <pc:chgData name="Fatima Pillosu" userId="a6295d4dc9e22643" providerId="LiveId" clId="{86F396D1-7CDF-424C-B865-C984153A0302}"/>
+    <pc:docChg chg="undo custSel modSld">
+      <pc:chgData name="Fatima Pillosu" userId="a6295d4dc9e22643" providerId="LiveId" clId="{86F396D1-7CDF-424C-B865-C984153A0302}" dt="2022-07-22T05:55:53.375" v="829" actId="1038"/>
+      <pc:docMkLst>
+        <pc:docMk/>
+      </pc:docMkLst>
+      <pc:sldChg chg="addSp delSp modSp mod">
+        <pc:chgData name="Fatima Pillosu" userId="a6295d4dc9e22643" providerId="LiveId" clId="{86F396D1-7CDF-424C-B865-C984153A0302}" dt="2022-07-22T05:55:53.375" v="829" actId="1038"/>
+        <pc:sldMkLst>
+          <pc:docMk/>
+          <pc:sldMk cId="1853236471" sldId="258"/>
+        </pc:sldMkLst>
+        <pc:spChg chg="mod">
+          <ac:chgData name="Fatima Pillosu" userId="a6295d4dc9e22643" providerId="LiveId" clId="{86F396D1-7CDF-424C-B865-C984153A0302}" dt="2022-07-22T05:51:24.195" v="789" actId="1036"/>
+          <ac:spMkLst>
+            <pc:docMk/>
+            <pc:sldMk cId="1853236471" sldId="258"/>
+            <ac:spMk id="2" creationId="{12D52415-6F9F-4183-BFC5-5E673D58BF26}"/>
+          </ac:spMkLst>
+        </pc:spChg>
+        <pc:spChg chg="add mod">
+          <ac:chgData name="Fatima Pillosu" userId="a6295d4dc9e22643" providerId="LiveId" clId="{86F396D1-7CDF-424C-B865-C984153A0302}" dt="2022-07-22T05:51:24.195" v="789" actId="1036"/>
+          <ac:spMkLst>
+            <pc:docMk/>
+            <pc:sldMk cId="1853236471" sldId="258"/>
+            <ac:spMk id="5" creationId="{1E79C216-D4FF-40DD-8B6E-58021D6B7F96}"/>
+          </ac:spMkLst>
+        </pc:spChg>
+        <pc:spChg chg="add mod">
+          <ac:chgData name="Fatima Pillosu" userId="a6295d4dc9e22643" providerId="LiveId" clId="{86F396D1-7CDF-424C-B865-C984153A0302}" dt="2022-07-22T05:51:24.195" v="789" actId="1036"/>
+          <ac:spMkLst>
+            <pc:docMk/>
+            <pc:sldMk cId="1853236471" sldId="258"/>
+            <ac:spMk id="85" creationId="{4980A7A2-0F2A-4899-8EFA-7535DD820D2A}"/>
+          </ac:spMkLst>
+        </pc:spChg>
+        <pc:spChg chg="add mod">
+          <ac:chgData name="Fatima Pillosu" userId="a6295d4dc9e22643" providerId="LiveId" clId="{86F396D1-7CDF-424C-B865-C984153A0302}" dt="2022-07-22T05:51:24.195" v="789" actId="1036"/>
+          <ac:spMkLst>
+            <pc:docMk/>
+            <pc:sldMk cId="1853236471" sldId="258"/>
+            <ac:spMk id="86" creationId="{1CB17BD8-41CB-4412-927B-4784EC79E0A9}"/>
+          </ac:spMkLst>
+        </pc:spChg>
+        <pc:spChg chg="add del mod">
+          <ac:chgData name="Fatima Pillosu" userId="a6295d4dc9e22643" providerId="LiveId" clId="{86F396D1-7CDF-424C-B865-C984153A0302}" dt="2022-07-22T05:34:24.001" v="58" actId="478"/>
+          <ac:spMkLst>
+            <pc:docMk/>
+            <pc:sldMk cId="1853236471" sldId="258"/>
+            <ac:spMk id="87" creationId="{2DF1AED6-7E6A-45CF-A869-82D19AC846C9}"/>
+          </ac:spMkLst>
+        </pc:spChg>
+        <pc:spChg chg="add mod">
+          <ac:chgData name="Fatima Pillosu" userId="a6295d4dc9e22643" providerId="LiveId" clId="{86F396D1-7CDF-424C-B865-C984153A0302}" dt="2022-07-22T05:51:24.195" v="789" actId="1036"/>
+          <ac:spMkLst>
+            <pc:docMk/>
+            <pc:sldMk cId="1853236471" sldId="258"/>
+            <ac:spMk id="88" creationId="{03C51D11-02FF-475D-BFB7-1DF53A0E7123}"/>
+          </ac:spMkLst>
+        </pc:spChg>
+        <pc:spChg chg="add mod">
+          <ac:chgData name="Fatima Pillosu" userId="a6295d4dc9e22643" providerId="LiveId" clId="{86F396D1-7CDF-424C-B865-C984153A0302}" dt="2022-07-22T05:51:24.195" v="789" actId="1036"/>
+          <ac:spMkLst>
+            <pc:docMk/>
+            <pc:sldMk cId="1853236471" sldId="258"/>
+            <ac:spMk id="89" creationId="{1C765805-96E1-4B3E-B89B-378130C3F354}"/>
+          </ac:spMkLst>
+        </pc:spChg>
+        <pc:spChg chg="add mod">
+          <ac:chgData name="Fatima Pillosu" userId="a6295d4dc9e22643" providerId="LiveId" clId="{86F396D1-7CDF-424C-B865-C984153A0302}" dt="2022-07-22T05:51:24.195" v="789" actId="1036"/>
+          <ac:spMkLst>
+            <pc:docMk/>
+            <pc:sldMk cId="1853236471" sldId="258"/>
+            <ac:spMk id="90" creationId="{43602DDF-4FE9-434B-BF0A-57DD785A5592}"/>
+          </ac:spMkLst>
+        </pc:spChg>
+        <pc:spChg chg="add mod">
+          <ac:chgData name="Fatima Pillosu" userId="a6295d4dc9e22643" providerId="LiveId" clId="{86F396D1-7CDF-424C-B865-C984153A0302}" dt="2022-07-22T05:51:24.195" v="789" actId="1036"/>
+          <ac:spMkLst>
+            <pc:docMk/>
+            <pc:sldMk cId="1853236471" sldId="258"/>
+            <ac:spMk id="93" creationId="{38C1B801-8BE9-41ED-B7B7-44DCC2CD309C}"/>
+          </ac:spMkLst>
+        </pc:spChg>
+        <pc:spChg chg="add del mod">
+          <ac:chgData name="Fatima Pillosu" userId="a6295d4dc9e22643" providerId="LiveId" clId="{86F396D1-7CDF-424C-B865-C984153A0302}" dt="2022-07-22T05:39:52.501" v="219" actId="478"/>
+          <ac:spMkLst>
+            <pc:docMk/>
+            <pc:sldMk cId="1853236471" sldId="258"/>
+            <ac:spMk id="94" creationId="{DB31582B-1DA8-494A-AB76-1C26606E0779}"/>
+          </ac:spMkLst>
+        </pc:spChg>
+        <pc:spChg chg="add del mod">
+          <ac:chgData name="Fatima Pillosu" userId="a6295d4dc9e22643" providerId="LiveId" clId="{86F396D1-7CDF-424C-B865-C984153A0302}" dt="2022-07-22T05:39:50.693" v="218" actId="478"/>
+          <ac:spMkLst>
+            <pc:docMk/>
+            <pc:sldMk cId="1853236471" sldId="258"/>
+            <ac:spMk id="95" creationId="{05244F7A-D814-412C-AF5D-BFD4561419E3}"/>
+          </ac:spMkLst>
+        </pc:spChg>
+        <pc:spChg chg="add mod">
+          <ac:chgData name="Fatima Pillosu" userId="a6295d4dc9e22643" providerId="LiveId" clId="{86F396D1-7CDF-424C-B865-C984153A0302}" dt="2022-07-22T05:49:54.699" v="717" actId="1036"/>
+          <ac:spMkLst>
+            <pc:docMk/>
+            <pc:sldMk cId="1853236471" sldId="258"/>
+            <ac:spMk id="96" creationId="{E385D1B4-F190-430E-9C3B-68819046A583}"/>
+          </ac:spMkLst>
+        </pc:spChg>
+        <pc:spChg chg="add mod">
+          <ac:chgData name="Fatima Pillosu" userId="a6295d4dc9e22643" providerId="LiveId" clId="{86F396D1-7CDF-424C-B865-C984153A0302}" dt="2022-07-22T05:49:54.699" v="717" actId="1036"/>
+          <ac:spMkLst>
+            <pc:docMk/>
+            <pc:sldMk cId="1853236471" sldId="258"/>
+            <ac:spMk id="97" creationId="{B77B2DFE-46E7-4BF1-B03A-F614C98895F9}"/>
+          </ac:spMkLst>
+        </pc:spChg>
+        <pc:spChg chg="add mod">
+          <ac:chgData name="Fatima Pillosu" userId="a6295d4dc9e22643" providerId="LiveId" clId="{86F396D1-7CDF-424C-B865-C984153A0302}" dt="2022-07-22T05:49:54.699" v="717" actId="1036"/>
+          <ac:spMkLst>
+            <pc:docMk/>
+            <pc:sldMk cId="1853236471" sldId="258"/>
+            <ac:spMk id="98" creationId="{83E1012D-20AB-4F01-8AA8-F5DF94165F99}"/>
+          </ac:spMkLst>
+        </pc:spChg>
+        <pc:spChg chg="add mod">
+          <ac:chgData name="Fatima Pillosu" userId="a6295d4dc9e22643" providerId="LiveId" clId="{86F396D1-7CDF-424C-B865-C984153A0302}" dt="2022-07-22T05:49:54.699" v="717" actId="1036"/>
+          <ac:spMkLst>
+            <pc:docMk/>
+            <pc:sldMk cId="1853236471" sldId="258"/>
+            <ac:spMk id="99" creationId="{20445A9D-DBC2-44F9-BE59-F0EABCC19B4E}"/>
+          </ac:spMkLst>
+        </pc:spChg>
+        <pc:spChg chg="add mod">
+          <ac:chgData name="Fatima Pillosu" userId="a6295d4dc9e22643" providerId="LiveId" clId="{86F396D1-7CDF-424C-B865-C984153A0302}" dt="2022-07-22T05:49:23.517" v="686" actId="1035"/>
+          <ac:spMkLst>
+            <pc:docMk/>
+            <pc:sldMk cId="1853236471" sldId="258"/>
+            <ac:spMk id="100" creationId="{18FA9629-D01E-4B95-BA29-1A87AC866A24}"/>
+          </ac:spMkLst>
+        </pc:spChg>
+        <pc:spChg chg="add mod">
+          <ac:chgData name="Fatima Pillosu" userId="a6295d4dc9e22643" providerId="LiveId" clId="{86F396D1-7CDF-424C-B865-C984153A0302}" dt="2022-07-22T05:47:42.122" v="578" actId="571"/>
+          <ac:spMkLst>
+            <pc:docMk/>
+            <pc:sldMk cId="1853236471" sldId="258"/>
+            <ac:spMk id="101" creationId="{28143D6D-39D3-45D1-851E-6F1A21E37D2D}"/>
+          </ac:spMkLst>
+        </pc:spChg>
+        <pc:spChg chg="add mod">
+          <ac:chgData name="Fatima Pillosu" userId="a6295d4dc9e22643" providerId="LiveId" clId="{86F396D1-7CDF-424C-B865-C984153A0302}" dt="2022-07-22T05:47:42.122" v="578" actId="571"/>
+          <ac:spMkLst>
+            <pc:docMk/>
+            <pc:sldMk cId="1853236471" sldId="258"/>
+            <ac:spMk id="102" creationId="{390B2CB3-FD97-4856-8642-838D37192A5B}"/>
+          </ac:spMkLst>
+        </pc:spChg>
+        <pc:spChg chg="mod">
+          <ac:chgData name="Fatima Pillosu" userId="a6295d4dc9e22643" providerId="LiveId" clId="{86F396D1-7CDF-424C-B865-C984153A0302}" dt="2022-07-22T05:51:24.195" v="789" actId="1036"/>
+          <ac:spMkLst>
+            <pc:docMk/>
+            <pc:sldMk cId="1853236471" sldId="258"/>
+            <ac:spMk id="104" creationId="{95F5FC5A-5430-43FB-AE9B-0A2051D30B39}"/>
+          </ac:spMkLst>
+        </pc:spChg>
+        <pc:spChg chg="mod">
+          <ac:chgData name="Fatima Pillosu" userId="a6295d4dc9e22643" providerId="LiveId" clId="{86F396D1-7CDF-424C-B865-C984153A0302}" dt="2022-07-22T05:51:24.195" v="789" actId="1036"/>
+          <ac:spMkLst>
+            <pc:docMk/>
+            <pc:sldMk cId="1853236471" sldId="258"/>
+            <ac:spMk id="105" creationId="{5AF8AADE-32E0-4F2D-AF25-8AA83F78433C}"/>
+          </ac:spMkLst>
+        </pc:spChg>
+        <pc:spChg chg="mod">
+          <ac:chgData name="Fatima Pillosu" userId="a6295d4dc9e22643" providerId="LiveId" clId="{86F396D1-7CDF-424C-B865-C984153A0302}" dt="2022-07-22T05:51:24.195" v="789" actId="1036"/>
+          <ac:spMkLst>
+            <pc:docMk/>
+            <pc:sldMk cId="1853236471" sldId="258"/>
+            <ac:spMk id="106" creationId="{3F5AC802-9FF0-4390-8592-A60E0412718F}"/>
+          </ac:spMkLst>
+        </pc:spChg>
+        <pc:spChg chg="mod">
+          <ac:chgData name="Fatima Pillosu" userId="a6295d4dc9e22643" providerId="LiveId" clId="{86F396D1-7CDF-424C-B865-C984153A0302}" dt="2022-07-22T05:51:24.195" v="789" actId="1036"/>
+          <ac:spMkLst>
+            <pc:docMk/>
+            <pc:sldMk cId="1853236471" sldId="258"/>
+            <ac:spMk id="107" creationId="{724FDC21-0BB8-4948-A666-8B5FAB9FC72A}"/>
+          </ac:spMkLst>
+        </pc:spChg>
+        <pc:spChg chg="mod">
+          <ac:chgData name="Fatima Pillosu" userId="a6295d4dc9e22643" providerId="LiveId" clId="{86F396D1-7CDF-424C-B865-C984153A0302}" dt="2022-07-22T05:51:24.195" v="789" actId="1036"/>
+          <ac:spMkLst>
+            <pc:docMk/>
+            <pc:sldMk cId="1853236471" sldId="258"/>
+            <ac:spMk id="108" creationId="{1D7C31CE-5BC2-481D-AF97-54F4E85222FE}"/>
+          </ac:spMkLst>
+        </pc:spChg>
+        <pc:spChg chg="add mod">
+          <ac:chgData name="Fatima Pillosu" userId="a6295d4dc9e22643" providerId="LiveId" clId="{86F396D1-7CDF-424C-B865-C984153A0302}" dt="2022-07-22T05:52:12.652" v="795" actId="1038"/>
+          <ac:spMkLst>
+            <pc:docMk/>
+            <pc:sldMk cId="1853236471" sldId="258"/>
+            <ac:spMk id="109" creationId="{6BC9434B-B71F-4324-A16E-320D4DD34F09}"/>
+          </ac:spMkLst>
+        </pc:spChg>
+        <pc:spChg chg="add mod">
+          <ac:chgData name="Fatima Pillosu" userId="a6295d4dc9e22643" providerId="LiveId" clId="{86F396D1-7CDF-424C-B865-C984153A0302}" dt="2022-07-22T05:52:33.928" v="799" actId="1035"/>
+          <ac:spMkLst>
+            <pc:docMk/>
+            <pc:sldMk cId="1853236471" sldId="258"/>
+            <ac:spMk id="111" creationId="{86C48127-6EC2-4090-88CA-6A1480DA6D9F}"/>
+          </ac:spMkLst>
+        </pc:spChg>
+        <pc:spChg chg="add mod">
+          <ac:chgData name="Fatima Pillosu" userId="a6295d4dc9e22643" providerId="LiveId" clId="{86F396D1-7CDF-424C-B865-C984153A0302}" dt="2022-07-22T05:53:14.957" v="803" actId="1076"/>
+          <ac:spMkLst>
+            <pc:docMk/>
+            <pc:sldMk cId="1853236471" sldId="258"/>
+            <ac:spMk id="113" creationId="{0DC9380A-1902-4D73-8C20-374C9F539D71}"/>
+          </ac:spMkLst>
+        </pc:spChg>
+        <pc:spChg chg="add mod">
+          <ac:chgData name="Fatima Pillosu" userId="a6295d4dc9e22643" providerId="LiveId" clId="{86F396D1-7CDF-424C-B865-C984153A0302}" dt="2022-07-22T05:53:28.617" v="805" actId="1076"/>
+          <ac:spMkLst>
+            <pc:docMk/>
+            <pc:sldMk cId="1853236471" sldId="258"/>
+            <ac:spMk id="115" creationId="{B82532E5-3F25-41EA-8D57-8A40F314C54B}"/>
+          </ac:spMkLst>
+        </pc:spChg>
+        <pc:spChg chg="add mod">
+          <ac:chgData name="Fatima Pillosu" userId="a6295d4dc9e22643" providerId="LiveId" clId="{86F396D1-7CDF-424C-B865-C984153A0302}" dt="2022-07-22T05:53:47.850" v="808" actId="1076"/>
+          <ac:spMkLst>
+            <pc:docMk/>
+            <pc:sldMk cId="1853236471" sldId="258"/>
+            <ac:spMk id="117" creationId="{A690ED56-8DD1-4CBC-B01A-E113250B74B3}"/>
+          </ac:spMkLst>
+        </pc:spChg>
+        <pc:spChg chg="add mod">
+          <ac:chgData name="Fatima Pillosu" userId="a6295d4dc9e22643" providerId="LiveId" clId="{86F396D1-7CDF-424C-B865-C984153A0302}" dt="2022-07-22T05:54:20.012" v="811" actId="1036"/>
+          <ac:spMkLst>
+            <pc:docMk/>
+            <pc:sldMk cId="1853236471" sldId="258"/>
+            <ac:spMk id="119" creationId="{CCB53309-59A9-49D4-B5F2-FBD5AF84B07B}"/>
+          </ac:spMkLst>
+        </pc:spChg>
+        <pc:spChg chg="add mod">
+          <ac:chgData name="Fatima Pillosu" userId="a6295d4dc9e22643" providerId="LiveId" clId="{86F396D1-7CDF-424C-B865-C984153A0302}" dt="2022-07-22T05:54:34.136" v="814" actId="1076"/>
+          <ac:spMkLst>
+            <pc:docMk/>
+            <pc:sldMk cId="1853236471" sldId="258"/>
+            <ac:spMk id="121" creationId="{D98D5718-99F8-44AE-81DE-0499B9116A49}"/>
+          </ac:spMkLst>
+        </pc:spChg>
+        <pc:spChg chg="add mod">
+          <ac:chgData name="Fatima Pillosu" userId="a6295d4dc9e22643" providerId="LiveId" clId="{86F396D1-7CDF-424C-B865-C984153A0302}" dt="2022-07-22T05:55:22.857" v="823" actId="1036"/>
+          <ac:spMkLst>
+            <pc:docMk/>
+            <pc:sldMk cId="1853236471" sldId="258"/>
+            <ac:spMk id="123" creationId="{23B115A7-D3EE-4F0F-96F1-83E270E0E3B9}"/>
+          </ac:spMkLst>
+        </pc:spChg>
+        <pc:spChg chg="mod">
+          <ac:chgData name="Fatima Pillosu" userId="a6295d4dc9e22643" providerId="LiveId" clId="{86F396D1-7CDF-424C-B865-C984153A0302}" dt="2022-07-22T05:51:24.195" v="789" actId="1036"/>
+          <ac:spMkLst>
+            <pc:docMk/>
+            <pc:sldMk cId="1853236471" sldId="258"/>
+            <ac:spMk id="126" creationId="{C0ACB2F8-0B9E-4A5A-BE9C-F5FE0B5F23D4}"/>
+          </ac:spMkLst>
+        </pc:spChg>
+        <pc:spChg chg="add mod">
+          <ac:chgData name="Fatima Pillosu" userId="a6295d4dc9e22643" providerId="LiveId" clId="{86F396D1-7CDF-424C-B865-C984153A0302}" dt="2022-07-22T05:55:33.780" v="826" actId="1038"/>
+          <ac:spMkLst>
+            <pc:docMk/>
+            <pc:sldMk cId="1853236471" sldId="258"/>
+            <ac:spMk id="127" creationId="{57663907-7F4C-4F7A-9FCD-A7512037A3C2}"/>
+          </ac:spMkLst>
+        </pc:spChg>
+        <pc:spChg chg="del mod">
+          <ac:chgData name="Fatima Pillosu" userId="a6295d4dc9e22643" providerId="LiveId" clId="{86F396D1-7CDF-424C-B865-C984153A0302}" dt="2022-07-22T05:33:57.557" v="53" actId="478"/>
+          <ac:spMkLst>
+            <pc:docMk/>
+            <pc:sldMk cId="1853236471" sldId="258"/>
+            <ac:spMk id="129" creationId="{D330A620-6087-45C6-85A5-31C145E300D8}"/>
+          </ac:spMkLst>
+        </pc:spChg>
+        <pc:spChg chg="del mod">
+          <ac:chgData name="Fatima Pillosu" userId="a6295d4dc9e22643" providerId="LiveId" clId="{86F396D1-7CDF-424C-B865-C984153A0302}" dt="2022-07-22T05:34:16.960" v="56" actId="478"/>
+          <ac:spMkLst>
+            <pc:docMk/>
+            <pc:sldMk cId="1853236471" sldId="258"/>
+            <ac:spMk id="131" creationId="{FFC23E94-3384-4A5C-BFF4-46E125061AEE}"/>
+          </ac:spMkLst>
+        </pc:spChg>
+        <pc:spChg chg="del mod">
+          <ac:chgData name="Fatima Pillosu" userId="a6295d4dc9e22643" providerId="LiveId" clId="{86F396D1-7CDF-424C-B865-C984153A0302}" dt="2022-07-22T05:34:26.545" v="59" actId="478"/>
+          <ac:spMkLst>
+            <pc:docMk/>
+            <pc:sldMk cId="1853236471" sldId="258"/>
+            <ac:spMk id="133" creationId="{2A4F0432-01E5-4A76-A408-08192B227F02}"/>
+          </ac:spMkLst>
+        </pc:spChg>
+        <pc:spChg chg="del mod">
+          <ac:chgData name="Fatima Pillosu" userId="a6295d4dc9e22643" providerId="LiveId" clId="{86F396D1-7CDF-424C-B865-C984153A0302}" dt="2022-07-22T05:34:28.599" v="60" actId="478"/>
+          <ac:spMkLst>
+            <pc:docMk/>
+            <pc:sldMk cId="1853236471" sldId="258"/>
+            <ac:spMk id="135" creationId="{16AFF4DD-7A8D-474F-BDC4-04324BCC516C}"/>
+          </ac:spMkLst>
+        </pc:spChg>
+        <pc:spChg chg="del mod">
+          <ac:chgData name="Fatima Pillosu" userId="a6295d4dc9e22643" providerId="LiveId" clId="{86F396D1-7CDF-424C-B865-C984153A0302}" dt="2022-07-22T05:34:30.458" v="61" actId="478"/>
+          <ac:spMkLst>
+            <pc:docMk/>
+            <pc:sldMk cId="1853236471" sldId="258"/>
+            <ac:spMk id="137" creationId="{FE050DCD-CC6A-41F3-8C19-0DAE53C0F3A7}"/>
+          </ac:spMkLst>
+        </pc:spChg>
+        <pc:spChg chg="add mod">
+          <ac:chgData name="Fatima Pillosu" userId="a6295d4dc9e22643" providerId="LiveId" clId="{86F396D1-7CDF-424C-B865-C984153A0302}" dt="2022-07-22T05:55:53.375" v="829" actId="1038"/>
+          <ac:spMkLst>
+            <pc:docMk/>
+            <pc:sldMk cId="1853236471" sldId="258"/>
+            <ac:spMk id="139" creationId="{18077344-B0C5-4D88-BBE9-314749A1586B}"/>
+          </ac:spMkLst>
+        </pc:spChg>
+        <pc:spChg chg="mod">
+          <ac:chgData name="Fatima Pillosu" userId="a6295d4dc9e22643" providerId="LiveId" clId="{86F396D1-7CDF-424C-B865-C984153A0302}" dt="2022-07-22T05:49:35.915" v="712" actId="1036"/>
+          <ac:spMkLst>
+            <pc:docMk/>
+            <pc:sldMk cId="1853236471" sldId="258"/>
+            <ac:spMk id="350" creationId="{7F19B993-CBD2-466D-95EC-7EAE6407A0DF}"/>
+          </ac:spMkLst>
+        </pc:spChg>
+        <pc:spChg chg="mod">
+          <ac:chgData name="Fatima Pillosu" userId="a6295d4dc9e22643" providerId="LiveId" clId="{86F396D1-7CDF-424C-B865-C984153A0302}" dt="2022-07-22T05:49:35.915" v="712" actId="1036"/>
+          <ac:spMkLst>
+            <pc:docMk/>
+            <pc:sldMk cId="1853236471" sldId="258"/>
+            <ac:spMk id="352" creationId="{511C17CC-78E4-4E0A-B9AB-18ECFFB6F91F}"/>
+          </ac:spMkLst>
+        </pc:spChg>
+        <pc:spChg chg="mod">
+          <ac:chgData name="Fatima Pillosu" userId="a6295d4dc9e22643" providerId="LiveId" clId="{86F396D1-7CDF-424C-B865-C984153A0302}" dt="2022-07-22T05:49:35.915" v="712" actId="1036"/>
+          <ac:spMkLst>
+            <pc:docMk/>
+            <pc:sldMk cId="1853236471" sldId="258"/>
+            <ac:spMk id="354" creationId="{C52D2110-DBB9-4DE3-AEC8-D0AAD3FB5651}"/>
+          </ac:spMkLst>
+        </pc:spChg>
+        <pc:spChg chg="mod">
+          <ac:chgData name="Fatima Pillosu" userId="a6295d4dc9e22643" providerId="LiveId" clId="{86F396D1-7CDF-424C-B865-C984153A0302}" dt="2022-07-22T05:49:35.915" v="712" actId="1036"/>
+          <ac:spMkLst>
+            <pc:docMk/>
+            <pc:sldMk cId="1853236471" sldId="258"/>
+            <ac:spMk id="356" creationId="{CF43ACB2-07C3-4687-8A6D-2620A350B439}"/>
+          </ac:spMkLst>
+        </pc:spChg>
+        <pc:spChg chg="mod">
+          <ac:chgData name="Fatima Pillosu" userId="a6295d4dc9e22643" providerId="LiveId" clId="{86F396D1-7CDF-424C-B865-C984153A0302}" dt="2022-07-22T05:50:44.995" v="752" actId="1035"/>
+          <ac:spMkLst>
+            <pc:docMk/>
+            <pc:sldMk cId="1853236471" sldId="258"/>
+            <ac:spMk id="358" creationId="{05A2A533-D203-4F1C-B193-419DA64C545B}"/>
+          </ac:spMkLst>
+        </pc:spChg>
+        <pc:spChg chg="mod">
+          <ac:chgData name="Fatima Pillosu" userId="a6295d4dc9e22643" providerId="LiveId" clId="{86F396D1-7CDF-424C-B865-C984153A0302}" dt="2022-07-22T05:49:35.915" v="712" actId="1036"/>
+          <ac:spMkLst>
+            <pc:docMk/>
+            <pc:sldMk cId="1853236471" sldId="258"/>
+            <ac:spMk id="360" creationId="{44645B24-5DFC-40E8-923A-06E42F48BBE7}"/>
+          </ac:spMkLst>
+        </pc:spChg>
+        <pc:spChg chg="mod">
+          <ac:chgData name="Fatima Pillosu" userId="a6295d4dc9e22643" providerId="LiveId" clId="{86F396D1-7CDF-424C-B865-C984153A0302}" dt="2022-07-22T05:49:35.915" v="712" actId="1036"/>
+          <ac:spMkLst>
+            <pc:docMk/>
+            <pc:sldMk cId="1853236471" sldId="258"/>
+            <ac:spMk id="362" creationId="{247C47D9-4E77-4551-A736-12053A034B1D}"/>
+          </ac:spMkLst>
+        </pc:spChg>
+        <pc:spChg chg="mod">
+          <ac:chgData name="Fatima Pillosu" userId="a6295d4dc9e22643" providerId="LiveId" clId="{86F396D1-7CDF-424C-B865-C984153A0302}" dt="2022-07-22T05:51:24.195" v="789" actId="1036"/>
+          <ac:spMkLst>
+            <pc:docMk/>
+            <pc:sldMk cId="1853236471" sldId="258"/>
+            <ac:spMk id="367" creationId="{62F00B66-D244-4124-BC82-DA9797F6A514}"/>
+          </ac:spMkLst>
+        </pc:spChg>
+        <pc:spChg chg="mod">
+          <ac:chgData name="Fatima Pillosu" userId="a6295d4dc9e22643" providerId="LiveId" clId="{86F396D1-7CDF-424C-B865-C984153A0302}" dt="2022-07-22T05:51:24.195" v="789" actId="1036"/>
+          <ac:spMkLst>
+            <pc:docMk/>
+            <pc:sldMk cId="1853236471" sldId="258"/>
+            <ac:spMk id="368" creationId="{28B6C3BD-1ED2-4947-81AD-33C99BFE43CB}"/>
+          </ac:spMkLst>
+        </pc:spChg>
+        <pc:spChg chg="mod">
+          <ac:chgData name="Fatima Pillosu" userId="a6295d4dc9e22643" providerId="LiveId" clId="{86F396D1-7CDF-424C-B865-C984153A0302}" dt="2022-07-22T05:51:24.195" v="789" actId="1036"/>
+          <ac:spMkLst>
+            <pc:docMk/>
+            <pc:sldMk cId="1853236471" sldId="258"/>
+            <ac:spMk id="375" creationId="{A226A05A-0FAE-4E77-8244-1AFC9C448C6F}"/>
+          </ac:spMkLst>
+        </pc:spChg>
+        <pc:spChg chg="mod">
+          <ac:chgData name="Fatima Pillosu" userId="a6295d4dc9e22643" providerId="LiveId" clId="{86F396D1-7CDF-424C-B865-C984153A0302}" dt="2022-07-22T05:51:24.195" v="789" actId="1036"/>
+          <ac:spMkLst>
+            <pc:docMk/>
+            <pc:sldMk cId="1853236471" sldId="258"/>
+            <ac:spMk id="386" creationId="{DC684FC2-2688-4CE8-B7DD-2ADE3EE93320}"/>
+          </ac:spMkLst>
+        </pc:spChg>
+        <pc:spChg chg="mod">
+          <ac:chgData name="Fatima Pillosu" userId="a6295d4dc9e22643" providerId="LiveId" clId="{86F396D1-7CDF-424C-B865-C984153A0302}" dt="2022-07-22T05:51:24.195" v="789" actId="1036"/>
+          <ac:spMkLst>
+            <pc:docMk/>
+            <pc:sldMk cId="1853236471" sldId="258"/>
+            <ac:spMk id="397" creationId="{4092983F-8B99-4BB8-BC0F-338CB0F42034}"/>
+          </ac:spMkLst>
+        </pc:spChg>
+        <pc:grpChg chg="mod">
+          <ac:chgData name="Fatima Pillosu" userId="a6295d4dc9e22643" providerId="LiveId" clId="{86F396D1-7CDF-424C-B865-C984153A0302}" dt="2022-07-22T05:51:24.195" v="789" actId="1036"/>
+          <ac:grpSpMkLst>
+            <pc:docMk/>
+            <pc:sldMk cId="1853236471" sldId="258"/>
+            <ac:grpSpMk id="376" creationId="{7F305228-259F-49CA-BBF0-ED1B09496469}"/>
+          </ac:grpSpMkLst>
+        </pc:grpChg>
+        <pc:grpChg chg="mod">
+          <ac:chgData name="Fatima Pillosu" userId="a6295d4dc9e22643" providerId="LiveId" clId="{86F396D1-7CDF-424C-B865-C984153A0302}" dt="2022-07-22T05:51:24.195" v="789" actId="1036"/>
+          <ac:grpSpMkLst>
+            <pc:docMk/>
+            <pc:sldMk cId="1853236471" sldId="258"/>
+            <ac:grpSpMk id="381" creationId="{A702BA4D-3901-4891-A155-3C867E69CB95}"/>
+          </ac:grpSpMkLst>
+        </pc:grpChg>
+        <pc:grpChg chg="mod">
+          <ac:chgData name="Fatima Pillosu" userId="a6295d4dc9e22643" providerId="LiveId" clId="{86F396D1-7CDF-424C-B865-C984153A0302}" dt="2022-07-22T05:51:24.195" v="789" actId="1036"/>
+          <ac:grpSpMkLst>
+            <pc:docMk/>
+            <pc:sldMk cId="1853236471" sldId="258"/>
+            <ac:grpSpMk id="387" creationId="{03FF6F76-A764-4A8F-9272-413BB4B890F3}"/>
+          </ac:grpSpMkLst>
+        </pc:grpChg>
+        <pc:grpChg chg="mod">
+          <ac:chgData name="Fatima Pillosu" userId="a6295d4dc9e22643" providerId="LiveId" clId="{86F396D1-7CDF-424C-B865-C984153A0302}" dt="2022-07-22T05:51:24.195" v="789" actId="1036"/>
+          <ac:grpSpMkLst>
+            <pc:docMk/>
+            <pc:sldMk cId="1853236471" sldId="258"/>
+            <ac:grpSpMk id="392" creationId="{2395E7D5-D308-41EA-B813-2A6FB80CE058}"/>
+          </ac:grpSpMkLst>
+        </pc:grpChg>
+        <pc:grpChg chg="mod">
+          <ac:chgData name="Fatima Pillosu" userId="a6295d4dc9e22643" providerId="LiveId" clId="{86F396D1-7CDF-424C-B865-C984153A0302}" dt="2022-07-22T05:51:24.195" v="789" actId="1036"/>
+          <ac:grpSpMkLst>
+            <pc:docMk/>
+            <pc:sldMk cId="1853236471" sldId="258"/>
+            <ac:grpSpMk id="398" creationId="{4073F158-C038-4BFB-8FDB-C03724692366}"/>
+          </ac:grpSpMkLst>
+        </pc:grpChg>
+        <pc:grpChg chg="mod">
+          <ac:chgData name="Fatima Pillosu" userId="a6295d4dc9e22643" providerId="LiveId" clId="{86F396D1-7CDF-424C-B865-C984153A0302}" dt="2022-07-22T05:51:24.195" v="789" actId="1036"/>
+          <ac:grpSpMkLst>
+            <pc:docMk/>
+            <pc:sldMk cId="1853236471" sldId="258"/>
+            <ac:grpSpMk id="403" creationId="{751505F4-61F8-4050-8172-E397F9DCC3CF}"/>
+          </ac:grpSpMkLst>
+        </pc:grpChg>
+        <pc:picChg chg="mod">
+          <ac:chgData name="Fatima Pillosu" userId="a6295d4dc9e22643" providerId="LiveId" clId="{86F396D1-7CDF-424C-B865-C984153A0302}" dt="2022-07-22T05:51:24.195" v="789" actId="1036"/>
+          <ac:picMkLst>
+            <pc:docMk/>
+            <pc:sldMk cId="1853236471" sldId="258"/>
+            <ac:picMk id="8" creationId="{CDE0FE67-2E41-4973-B3E6-9E5EC963079C}"/>
+          </ac:picMkLst>
+        </pc:picChg>
+        <pc:picChg chg="mod">
+          <ac:chgData name="Fatima Pillosu" userId="a6295d4dc9e22643" providerId="LiveId" clId="{86F396D1-7CDF-424C-B865-C984153A0302}" dt="2022-07-22T05:51:24.195" v="789" actId="1036"/>
+          <ac:picMkLst>
+            <pc:docMk/>
+            <pc:sldMk cId="1853236471" sldId="258"/>
+            <ac:picMk id="12" creationId="{15F2179F-DF67-40F4-BD7A-1CBC565008F5}"/>
+          </ac:picMkLst>
+        </pc:picChg>
+        <pc:picChg chg="mod">
+          <ac:chgData name="Fatima Pillosu" userId="a6295d4dc9e22643" providerId="LiveId" clId="{86F396D1-7CDF-424C-B865-C984153A0302}" dt="2022-07-22T05:51:24.195" v="789" actId="1036"/>
+          <ac:picMkLst>
+            <pc:docMk/>
+            <pc:sldMk cId="1853236471" sldId="258"/>
+            <ac:picMk id="16" creationId="{D09AAEF1-7571-49DD-B6FF-E38550D3A55E}"/>
+          </ac:picMkLst>
+        </pc:picChg>
+        <pc:picChg chg="mod">
+          <ac:chgData name="Fatima Pillosu" userId="a6295d4dc9e22643" providerId="LiveId" clId="{86F396D1-7CDF-424C-B865-C984153A0302}" dt="2022-07-22T05:51:24.195" v="789" actId="1036"/>
+          <ac:picMkLst>
+            <pc:docMk/>
+            <pc:sldMk cId="1853236471" sldId="258"/>
+            <ac:picMk id="20" creationId="{1A01B256-9A5D-4773-BA33-D96E69CBD4DD}"/>
+          </ac:picMkLst>
+        </pc:picChg>
+        <pc:picChg chg="mod">
+          <ac:chgData name="Fatima Pillosu" userId="a6295d4dc9e22643" providerId="LiveId" clId="{86F396D1-7CDF-424C-B865-C984153A0302}" dt="2022-07-22T05:51:24.195" v="789" actId="1036"/>
+          <ac:picMkLst>
+            <pc:docMk/>
+            <pc:sldMk cId="1853236471" sldId="258"/>
+            <ac:picMk id="24" creationId="{4C49ADED-98DE-4E50-B0AF-0E49CA91A29B}"/>
+          </ac:picMkLst>
+        </pc:picChg>
+        <pc:picChg chg="mod">
+          <ac:chgData name="Fatima Pillosu" userId="a6295d4dc9e22643" providerId="LiveId" clId="{86F396D1-7CDF-424C-B865-C984153A0302}" dt="2022-07-22T05:51:24.195" v="789" actId="1036"/>
+          <ac:picMkLst>
+            <pc:docMk/>
+            <pc:sldMk cId="1853236471" sldId="258"/>
+            <ac:picMk id="28" creationId="{BD9F5AE9-8E21-4D9C-B55F-EA5D68DFDD9B}"/>
+          </ac:picMkLst>
+        </pc:picChg>
+        <pc:picChg chg="mod">
+          <ac:chgData name="Fatima Pillosu" userId="a6295d4dc9e22643" providerId="LiveId" clId="{86F396D1-7CDF-424C-B865-C984153A0302}" dt="2022-07-22T05:51:24.195" v="789" actId="1036"/>
+          <ac:picMkLst>
+            <pc:docMk/>
+            <pc:sldMk cId="1853236471" sldId="258"/>
+            <ac:picMk id="32" creationId="{445546BD-E8B8-458D-9247-CD032AF4699E}"/>
+          </ac:picMkLst>
+        </pc:picChg>
+        <pc:picChg chg="mod">
+          <ac:chgData name="Fatima Pillosu" userId="a6295d4dc9e22643" providerId="LiveId" clId="{86F396D1-7CDF-424C-B865-C984153A0302}" dt="2022-07-22T05:51:24.195" v="789" actId="1036"/>
+          <ac:picMkLst>
+            <pc:docMk/>
+            <pc:sldMk cId="1853236471" sldId="258"/>
+            <ac:picMk id="34" creationId="{98DF4285-9633-4EF7-B625-8C2A1AF7500A}"/>
+          </ac:picMkLst>
+        </pc:picChg>
+        <pc:picChg chg="mod">
+          <ac:chgData name="Fatima Pillosu" userId="a6295d4dc9e22643" providerId="LiveId" clId="{86F396D1-7CDF-424C-B865-C984153A0302}" dt="2022-07-22T05:51:24.195" v="789" actId="1036"/>
+          <ac:picMkLst>
+            <pc:docMk/>
+            <pc:sldMk cId="1853236471" sldId="258"/>
+            <ac:picMk id="36" creationId="{00ED8A2F-0C50-4A3A-A15C-86540B264ECC}"/>
+          </ac:picMkLst>
+        </pc:picChg>
+        <pc:picChg chg="mod">
+          <ac:chgData name="Fatima Pillosu" userId="a6295d4dc9e22643" providerId="LiveId" clId="{86F396D1-7CDF-424C-B865-C984153A0302}" dt="2022-07-22T05:51:24.195" v="789" actId="1036"/>
+          <ac:picMkLst>
+            <pc:docMk/>
+            <pc:sldMk cId="1853236471" sldId="258"/>
+            <ac:picMk id="38" creationId="{F53DAE0A-613A-4A67-8685-4A73A2AFB325}"/>
+          </ac:picMkLst>
+        </pc:picChg>
+        <pc:picChg chg="mod">
+          <ac:chgData name="Fatima Pillosu" userId="a6295d4dc9e22643" providerId="LiveId" clId="{86F396D1-7CDF-424C-B865-C984153A0302}" dt="2022-07-22T05:51:24.195" v="789" actId="1036"/>
+          <ac:picMkLst>
+            <pc:docMk/>
+            <pc:sldMk cId="1853236471" sldId="258"/>
+            <ac:picMk id="40" creationId="{52A56371-F983-45A5-BA4D-72297F861B6C}"/>
+          </ac:picMkLst>
+        </pc:picChg>
+        <pc:picChg chg="mod">
+          <ac:chgData name="Fatima Pillosu" userId="a6295d4dc9e22643" providerId="LiveId" clId="{86F396D1-7CDF-424C-B865-C984153A0302}" dt="2022-07-22T05:51:24.195" v="789" actId="1036"/>
+          <ac:picMkLst>
+            <pc:docMk/>
+            <pc:sldMk cId="1853236471" sldId="258"/>
+            <ac:picMk id="42" creationId="{01FFE5BA-376A-45C4-97D9-1C260796DCF2}"/>
+          </ac:picMkLst>
+        </pc:picChg>
+        <pc:cxnChg chg="add mod">
+          <ac:chgData name="Fatima Pillosu" userId="a6295d4dc9e22643" providerId="LiveId" clId="{86F396D1-7CDF-424C-B865-C984153A0302}" dt="2022-07-22T05:51:24.195" v="789" actId="1036"/>
+          <ac:cxnSpMkLst>
+            <pc:docMk/>
+            <pc:sldMk cId="1853236471" sldId="258"/>
+            <ac:cxnSpMk id="4" creationId="{4E9DF774-6B5D-4F71-B2B3-9575862BEBF9}"/>
+          </ac:cxnSpMkLst>
+        </pc:cxnChg>
+        <pc:cxnChg chg="add del mod">
+          <ac:chgData name="Fatima Pillosu" userId="a6295d4dc9e22643" providerId="LiveId" clId="{86F396D1-7CDF-424C-B865-C984153A0302}" dt="2022-07-22T05:32:08.695" v="27" actId="478"/>
+          <ac:cxnSpMkLst>
+            <pc:docMk/>
+            <pc:sldMk cId="1853236471" sldId="258"/>
+            <ac:cxnSpMk id="83" creationId="{6E2D206D-A864-4BCE-88B5-CC232A895B7A}"/>
+          </ac:cxnSpMkLst>
+        </pc:cxnChg>
+        <pc:cxnChg chg="add mod">
+          <ac:chgData name="Fatima Pillosu" userId="a6295d4dc9e22643" providerId="LiveId" clId="{86F396D1-7CDF-424C-B865-C984153A0302}" dt="2022-07-22T05:51:24.195" v="789" actId="1036"/>
+          <ac:cxnSpMkLst>
+            <pc:docMk/>
+            <pc:sldMk cId="1853236471" sldId="258"/>
+            <ac:cxnSpMk id="84" creationId="{1B5CB688-BF60-4EC4-8BC4-782744293B1C}"/>
+          </ac:cxnSpMkLst>
+        </pc:cxnChg>
+        <pc:cxnChg chg="add del mod">
+          <ac:chgData name="Fatima Pillosu" userId="a6295d4dc9e22643" providerId="LiveId" clId="{86F396D1-7CDF-424C-B865-C984153A0302}" dt="2022-07-22T05:36:03.971" v="78" actId="478"/>
+          <ac:cxnSpMkLst>
+            <pc:docMk/>
+            <pc:sldMk cId="1853236471" sldId="258"/>
+            <ac:cxnSpMk id="91" creationId="{052AC258-7C08-4530-968D-6031FC3E33AB}"/>
+          </ac:cxnSpMkLst>
+        </pc:cxnChg>
+        <pc:cxnChg chg="add mod">
+          <ac:chgData name="Fatima Pillosu" userId="a6295d4dc9e22643" providerId="LiveId" clId="{86F396D1-7CDF-424C-B865-C984153A0302}" dt="2022-07-22T05:52:12.652" v="795" actId="1038"/>
+          <ac:cxnSpMkLst>
+            <pc:docMk/>
+            <pc:sldMk cId="1853236471" sldId="258"/>
+            <ac:cxnSpMk id="103" creationId="{0F4A7DAB-E7ED-4D3F-960A-81CD2309CF25}"/>
+          </ac:cxnSpMkLst>
+        </pc:cxnChg>
+        <pc:cxnChg chg="add mod">
+          <ac:chgData name="Fatima Pillosu" userId="a6295d4dc9e22643" providerId="LiveId" clId="{86F396D1-7CDF-424C-B865-C984153A0302}" dt="2022-07-22T05:52:33.928" v="799" actId="1035"/>
+          <ac:cxnSpMkLst>
+            <pc:docMk/>
+            <pc:sldMk cId="1853236471" sldId="258"/>
+            <ac:cxnSpMk id="110" creationId="{4704B757-9678-47A0-81C5-745A92CB8432}"/>
+          </ac:cxnSpMkLst>
+        </pc:cxnChg>
+        <pc:cxnChg chg="add mod">
+          <ac:chgData name="Fatima Pillosu" userId="a6295d4dc9e22643" providerId="LiveId" clId="{86F396D1-7CDF-424C-B865-C984153A0302}" dt="2022-07-22T05:53:14.957" v="803" actId="1076"/>
+          <ac:cxnSpMkLst>
+            <pc:docMk/>
+            <pc:sldMk cId="1853236471" sldId="258"/>
+            <ac:cxnSpMk id="112" creationId="{7F6CBC28-CF54-43D9-A757-0D99352D58FC}"/>
+          </ac:cxnSpMkLst>
+        </pc:cxnChg>
+        <pc:cxnChg chg="add mod">
+          <ac:chgData name="Fatima Pillosu" userId="a6295d4dc9e22643" providerId="LiveId" clId="{86F396D1-7CDF-424C-B865-C984153A0302}" dt="2022-07-22T05:53:28.617" v="805" actId="1076"/>
+          <ac:cxnSpMkLst>
+            <pc:docMk/>
+            <pc:sldMk cId="1853236471" sldId="258"/>
+            <ac:cxnSpMk id="114" creationId="{A64F48AB-EB8E-466C-80F0-0F0F50C79832}"/>
+          </ac:cxnSpMkLst>
+        </pc:cxnChg>
+        <pc:cxnChg chg="add mod">
+          <ac:chgData name="Fatima Pillosu" userId="a6295d4dc9e22643" providerId="LiveId" clId="{86F396D1-7CDF-424C-B865-C984153A0302}" dt="2022-07-22T05:53:47.850" v="808" actId="1076"/>
+          <ac:cxnSpMkLst>
+            <pc:docMk/>
+            <pc:sldMk cId="1853236471" sldId="258"/>
+            <ac:cxnSpMk id="116" creationId="{708F28DA-97E3-4C3C-93D7-DCF4438C20FF}"/>
+          </ac:cxnSpMkLst>
+        </pc:cxnChg>
+        <pc:cxnChg chg="add mod">
+          <ac:chgData name="Fatima Pillosu" userId="a6295d4dc9e22643" providerId="LiveId" clId="{86F396D1-7CDF-424C-B865-C984153A0302}" dt="2022-07-22T05:54:20.012" v="811" actId="1036"/>
+          <ac:cxnSpMkLst>
+            <pc:docMk/>
+            <pc:sldMk cId="1853236471" sldId="258"/>
+            <ac:cxnSpMk id="118" creationId="{E52E8D97-F4E6-494B-AEFF-F239D930F3F3}"/>
+          </ac:cxnSpMkLst>
+        </pc:cxnChg>
+        <pc:cxnChg chg="add mod">
+          <ac:chgData name="Fatima Pillosu" userId="a6295d4dc9e22643" providerId="LiveId" clId="{86F396D1-7CDF-424C-B865-C984153A0302}" dt="2022-07-22T05:54:34.136" v="814" actId="1076"/>
+          <ac:cxnSpMkLst>
+            <pc:docMk/>
+            <pc:sldMk cId="1853236471" sldId="258"/>
+            <ac:cxnSpMk id="120" creationId="{D7A53FD3-3BC8-4265-8A6B-F2C112E21D8A}"/>
+          </ac:cxnSpMkLst>
+        </pc:cxnChg>
+        <pc:cxnChg chg="add mod">
+          <ac:chgData name="Fatima Pillosu" userId="a6295d4dc9e22643" providerId="LiveId" clId="{86F396D1-7CDF-424C-B865-C984153A0302}" dt="2022-07-22T05:55:22.857" v="823" actId="1036"/>
+          <ac:cxnSpMkLst>
+            <pc:docMk/>
+            <pc:sldMk cId="1853236471" sldId="258"/>
+            <ac:cxnSpMk id="122" creationId="{206B403A-F48B-434A-864D-7E700A7CC165}"/>
+          </ac:cxnSpMkLst>
+        </pc:cxnChg>
+        <pc:cxnChg chg="add mod">
+          <ac:chgData name="Fatima Pillosu" userId="a6295d4dc9e22643" providerId="LiveId" clId="{86F396D1-7CDF-424C-B865-C984153A0302}" dt="2022-07-22T05:55:33.780" v="826" actId="1038"/>
+          <ac:cxnSpMkLst>
+            <pc:docMk/>
+            <pc:sldMk cId="1853236471" sldId="258"/>
+            <ac:cxnSpMk id="124" creationId="{9C7EA058-4F07-4C77-814A-181A3B224800}"/>
+          </ac:cxnSpMkLst>
+        </pc:cxnChg>
+        <pc:cxnChg chg="mod">
+          <ac:chgData name="Fatima Pillosu" userId="a6295d4dc9e22643" providerId="LiveId" clId="{86F396D1-7CDF-424C-B865-C984153A0302}" dt="2022-07-22T05:51:24.195" v="789" actId="1036"/>
+          <ac:cxnSpMkLst>
+            <pc:docMk/>
+            <pc:sldMk cId="1853236471" sldId="258"/>
+            <ac:cxnSpMk id="125" creationId="{6B20D0A1-064C-4AA5-8CA5-26A490CFE9E6}"/>
+          </ac:cxnSpMkLst>
+        </pc:cxnChg>
+        <pc:cxnChg chg="mod">
+          <ac:chgData name="Fatima Pillosu" userId="a6295d4dc9e22643" providerId="LiveId" clId="{86F396D1-7CDF-424C-B865-C984153A0302}" dt="2022-07-22T05:51:24.195" v="789" actId="1036"/>
+          <ac:cxnSpMkLst>
+            <pc:docMk/>
+            <pc:sldMk cId="1853236471" sldId="258"/>
+            <ac:cxnSpMk id="128" creationId="{9ED81FFA-2398-4173-87FA-08725D34BC58}"/>
+          </ac:cxnSpMkLst>
+        </pc:cxnChg>
+        <pc:cxnChg chg="mod">
+          <ac:chgData name="Fatima Pillosu" userId="a6295d4dc9e22643" providerId="LiveId" clId="{86F396D1-7CDF-424C-B865-C984153A0302}" dt="2022-07-22T05:51:24.195" v="789" actId="1036"/>
+          <ac:cxnSpMkLst>
+            <pc:docMk/>
+            <pc:sldMk cId="1853236471" sldId="258"/>
+            <ac:cxnSpMk id="130" creationId="{5DD6E975-20E0-4C8D-8A7B-8715461BDCFD}"/>
+          </ac:cxnSpMkLst>
+        </pc:cxnChg>
+        <pc:cxnChg chg="mod">
+          <ac:chgData name="Fatima Pillosu" userId="a6295d4dc9e22643" providerId="LiveId" clId="{86F396D1-7CDF-424C-B865-C984153A0302}" dt="2022-07-22T05:51:24.195" v="789" actId="1036"/>
+          <ac:cxnSpMkLst>
+            <pc:docMk/>
+            <pc:sldMk cId="1853236471" sldId="258"/>
+            <ac:cxnSpMk id="132" creationId="{7DE9A4CF-9597-4A57-888F-8C13EA1DE93B}"/>
+          </ac:cxnSpMkLst>
+        </pc:cxnChg>
+        <pc:cxnChg chg="mod">
+          <ac:chgData name="Fatima Pillosu" userId="a6295d4dc9e22643" providerId="LiveId" clId="{86F396D1-7CDF-424C-B865-C984153A0302}" dt="2022-07-22T05:51:24.195" v="789" actId="1036"/>
+          <ac:cxnSpMkLst>
+            <pc:docMk/>
+            <pc:sldMk cId="1853236471" sldId="258"/>
+            <ac:cxnSpMk id="134" creationId="{EE33E613-7B7E-45D0-A96C-20DC0B5F764C}"/>
+          </ac:cxnSpMkLst>
+        </pc:cxnChg>
+        <pc:cxnChg chg="mod">
+          <ac:chgData name="Fatima Pillosu" userId="a6295d4dc9e22643" providerId="LiveId" clId="{86F396D1-7CDF-424C-B865-C984153A0302}" dt="2022-07-22T05:51:24.195" v="789" actId="1036"/>
+          <ac:cxnSpMkLst>
+            <pc:docMk/>
+            <pc:sldMk cId="1853236471" sldId="258"/>
+            <ac:cxnSpMk id="136" creationId="{08E59C1B-B40E-4ED8-ABAF-21457BE1B778}"/>
+          </ac:cxnSpMkLst>
+        </pc:cxnChg>
+        <pc:cxnChg chg="add mod">
+          <ac:chgData name="Fatima Pillosu" userId="a6295d4dc9e22643" providerId="LiveId" clId="{86F396D1-7CDF-424C-B865-C984153A0302}" dt="2022-07-22T05:55:53.375" v="829" actId="1038"/>
+          <ac:cxnSpMkLst>
+            <pc:docMk/>
+            <pc:sldMk cId="1853236471" sldId="258"/>
+            <ac:cxnSpMk id="138" creationId="{1BD3398A-8D4B-47DF-B3A1-F38710444138}"/>
+          </ac:cxnSpMkLst>
+        </pc:cxnChg>
+        <pc:cxnChg chg="mod">
+          <ac:chgData name="Fatima Pillosu" userId="a6295d4dc9e22643" providerId="LiveId" clId="{86F396D1-7CDF-424C-B865-C984153A0302}" dt="2022-07-22T05:49:35.915" v="712" actId="1036"/>
+          <ac:cxnSpMkLst>
+            <pc:docMk/>
+            <pc:sldMk cId="1853236471" sldId="258"/>
+            <ac:cxnSpMk id="349" creationId="{66F6F784-8396-4A56-8535-0922F4780287}"/>
+          </ac:cxnSpMkLst>
+        </pc:cxnChg>
+        <pc:cxnChg chg="mod">
+          <ac:chgData name="Fatima Pillosu" userId="a6295d4dc9e22643" providerId="LiveId" clId="{86F396D1-7CDF-424C-B865-C984153A0302}" dt="2022-07-22T05:49:35.915" v="712" actId="1036"/>
+          <ac:cxnSpMkLst>
+            <pc:docMk/>
+            <pc:sldMk cId="1853236471" sldId="258"/>
+            <ac:cxnSpMk id="351" creationId="{7DD78F4B-3CEA-421E-859F-EBE8F472C6BA}"/>
+          </ac:cxnSpMkLst>
+        </pc:cxnChg>
+        <pc:cxnChg chg="mod">
+          <ac:chgData name="Fatima Pillosu" userId="a6295d4dc9e22643" providerId="LiveId" clId="{86F396D1-7CDF-424C-B865-C984153A0302}" dt="2022-07-22T05:49:35.915" v="712" actId="1036"/>
+          <ac:cxnSpMkLst>
+            <pc:docMk/>
+            <pc:sldMk cId="1853236471" sldId="258"/>
+            <ac:cxnSpMk id="353" creationId="{26D59997-B252-4AD5-ADE0-E8DDB9413818}"/>
+          </ac:cxnSpMkLst>
+        </pc:cxnChg>
+        <pc:cxnChg chg="mod">
+          <ac:chgData name="Fatima Pillosu" userId="a6295d4dc9e22643" providerId="LiveId" clId="{86F396D1-7CDF-424C-B865-C984153A0302}" dt="2022-07-22T05:49:35.915" v="712" actId="1036"/>
+          <ac:cxnSpMkLst>
+            <pc:docMk/>
+            <pc:sldMk cId="1853236471" sldId="258"/>
+            <ac:cxnSpMk id="355" creationId="{954A0448-7F29-4488-94F3-D3680D76A25E}"/>
+          </ac:cxnSpMkLst>
+        </pc:cxnChg>
+        <pc:cxnChg chg="mod">
+          <ac:chgData name="Fatima Pillosu" userId="a6295d4dc9e22643" providerId="LiveId" clId="{86F396D1-7CDF-424C-B865-C984153A0302}" dt="2022-07-22T05:50:44.995" v="752" actId="1035"/>
+          <ac:cxnSpMkLst>
+            <pc:docMk/>
+            <pc:sldMk cId="1853236471" sldId="258"/>
+            <ac:cxnSpMk id="357" creationId="{52711C94-68DC-41E8-A28C-A3B95210D454}"/>
+          </ac:cxnSpMkLst>
+        </pc:cxnChg>
+        <pc:cxnChg chg="mod">
+          <ac:chgData name="Fatima Pillosu" userId="a6295d4dc9e22643" providerId="LiveId" clId="{86F396D1-7CDF-424C-B865-C984153A0302}" dt="2022-07-22T05:50:44.995" v="752" actId="1035"/>
+          <ac:cxnSpMkLst>
+            <pc:docMk/>
+            <pc:sldMk cId="1853236471" sldId="258"/>
+            <ac:cxnSpMk id="359" creationId="{CD65FEA7-C599-41A2-B7DE-8A5DE0E753C3}"/>
+          </ac:cxnSpMkLst>
+        </pc:cxnChg>
+        <pc:cxnChg chg="mod">
+          <ac:chgData name="Fatima Pillosu" userId="a6295d4dc9e22643" providerId="LiveId" clId="{86F396D1-7CDF-424C-B865-C984153A0302}" dt="2022-07-22T05:49:35.915" v="712" actId="1036"/>
+          <ac:cxnSpMkLst>
+            <pc:docMk/>
+            <pc:sldMk cId="1853236471" sldId="258"/>
+            <ac:cxnSpMk id="361" creationId="{E13E62BB-0169-4AA4-853E-F7E52F4F326A}"/>
+          </ac:cxnSpMkLst>
+        </pc:cxnChg>
       </pc:sldChg>
     </pc:docChg>
   </pc:docChgLst>
@@ -7327,7 +8111,7 @@
           <a:p>
             <a:fld id="{B80D15F6-78EE-4630-AC5E-09BE10AE3EAA}" type="datetimeFigureOut">
               <a:rPr lang="en-GB" smtClean="0"/>
-              <a:t>20/07/2022</a:t>
+              <a:t>22/07/2022</a:t>
             </a:fld>
             <a:endParaRPr lang="en-GB"/>
           </a:p>
@@ -7369,7 +8153,7 @@
           <a:p>
             <a:fld id="{E431324F-7260-48F1-BC87-E46D587744FD}" type="slidenum">
               <a:rPr lang="en-GB" smtClean="0"/>
-              <a:t>‹#›</a:t>
+              <a:t>‹N›</a:t>
             </a:fld>
             <a:endParaRPr lang="en-GB"/>
           </a:p>
@@ -7497,7 +8281,7 @@
           <a:p>
             <a:fld id="{B80D15F6-78EE-4630-AC5E-09BE10AE3EAA}" type="datetimeFigureOut">
               <a:rPr lang="en-GB" smtClean="0"/>
-              <a:t>20/07/2022</a:t>
+              <a:t>22/07/2022</a:t>
             </a:fld>
             <a:endParaRPr lang="en-GB"/>
           </a:p>
@@ -7539,7 +8323,7 @@
           <a:p>
             <a:fld id="{E431324F-7260-48F1-BC87-E46D587744FD}" type="slidenum">
               <a:rPr lang="en-GB" smtClean="0"/>
-              <a:t>‹#›</a:t>
+              <a:t>‹N›</a:t>
             </a:fld>
             <a:endParaRPr lang="en-GB"/>
           </a:p>
@@ -7677,7 +8461,7 @@
           <a:p>
             <a:fld id="{B80D15F6-78EE-4630-AC5E-09BE10AE3EAA}" type="datetimeFigureOut">
               <a:rPr lang="en-GB" smtClean="0"/>
-              <a:t>20/07/2022</a:t>
+              <a:t>22/07/2022</a:t>
             </a:fld>
             <a:endParaRPr lang="en-GB"/>
           </a:p>
@@ -7719,7 +8503,7 @@
           <a:p>
             <a:fld id="{E431324F-7260-48F1-BC87-E46D587744FD}" type="slidenum">
               <a:rPr lang="en-GB" smtClean="0"/>
-              <a:t>‹#›</a:t>
+              <a:t>‹N›</a:t>
             </a:fld>
             <a:endParaRPr lang="en-GB"/>
           </a:p>
@@ -7847,7 +8631,7 @@
           <a:p>
             <a:fld id="{B80D15F6-78EE-4630-AC5E-09BE10AE3EAA}" type="datetimeFigureOut">
               <a:rPr lang="en-GB" smtClean="0"/>
-              <a:t>20/07/2022</a:t>
+              <a:t>22/07/2022</a:t>
             </a:fld>
             <a:endParaRPr lang="en-GB"/>
           </a:p>
@@ -7889,7 +8673,7 @@
           <a:p>
             <a:fld id="{E431324F-7260-48F1-BC87-E46D587744FD}" type="slidenum">
               <a:rPr lang="en-GB" smtClean="0"/>
-              <a:t>‹#›</a:t>
+              <a:t>‹N›</a:t>
             </a:fld>
             <a:endParaRPr lang="en-GB"/>
           </a:p>
@@ -8091,7 +8875,7 @@
           <a:p>
             <a:fld id="{B80D15F6-78EE-4630-AC5E-09BE10AE3EAA}" type="datetimeFigureOut">
               <a:rPr lang="en-GB" smtClean="0"/>
-              <a:t>20/07/2022</a:t>
+              <a:t>22/07/2022</a:t>
             </a:fld>
             <a:endParaRPr lang="en-GB"/>
           </a:p>
@@ -8133,7 +8917,7 @@
           <a:p>
             <a:fld id="{E431324F-7260-48F1-BC87-E46D587744FD}" type="slidenum">
               <a:rPr lang="en-GB" smtClean="0"/>
-              <a:t>‹#›</a:t>
+              <a:t>‹N›</a:t>
             </a:fld>
             <a:endParaRPr lang="en-GB"/>
           </a:p>
@@ -8323,7 +9107,7 @@
           <a:p>
             <a:fld id="{B80D15F6-78EE-4630-AC5E-09BE10AE3EAA}" type="datetimeFigureOut">
               <a:rPr lang="en-GB" smtClean="0"/>
-              <a:t>20/07/2022</a:t>
+              <a:t>22/07/2022</a:t>
             </a:fld>
             <a:endParaRPr lang="en-GB"/>
           </a:p>
@@ -8365,7 +9149,7 @@
           <a:p>
             <a:fld id="{E431324F-7260-48F1-BC87-E46D587744FD}" type="slidenum">
               <a:rPr lang="en-GB" smtClean="0"/>
-              <a:t>‹#›</a:t>
+              <a:t>‹N›</a:t>
             </a:fld>
             <a:endParaRPr lang="en-GB"/>
           </a:p>
@@ -8690,7 +9474,7 @@
           <a:p>
             <a:fld id="{B80D15F6-78EE-4630-AC5E-09BE10AE3EAA}" type="datetimeFigureOut">
               <a:rPr lang="en-GB" smtClean="0"/>
-              <a:t>20/07/2022</a:t>
+              <a:t>22/07/2022</a:t>
             </a:fld>
             <a:endParaRPr lang="en-GB"/>
           </a:p>
@@ -8732,7 +9516,7 @@
           <a:p>
             <a:fld id="{E431324F-7260-48F1-BC87-E46D587744FD}" type="slidenum">
               <a:rPr lang="en-GB" smtClean="0"/>
-              <a:t>‹#›</a:t>
+              <a:t>‹N›</a:t>
             </a:fld>
             <a:endParaRPr lang="en-GB"/>
           </a:p>
@@ -8808,7 +9592,7 @@
           <a:p>
             <a:fld id="{B80D15F6-78EE-4630-AC5E-09BE10AE3EAA}" type="datetimeFigureOut">
               <a:rPr lang="en-GB" smtClean="0"/>
-              <a:t>20/07/2022</a:t>
+              <a:t>22/07/2022</a:t>
             </a:fld>
             <a:endParaRPr lang="en-GB"/>
           </a:p>
@@ -8850,7 +9634,7 @@
           <a:p>
             <a:fld id="{E431324F-7260-48F1-BC87-E46D587744FD}" type="slidenum">
               <a:rPr lang="en-GB" smtClean="0"/>
-              <a:t>‹#›</a:t>
+              <a:t>‹N›</a:t>
             </a:fld>
             <a:endParaRPr lang="en-GB"/>
           </a:p>
@@ -8903,7 +9687,7 @@
           <a:p>
             <a:fld id="{B80D15F6-78EE-4630-AC5E-09BE10AE3EAA}" type="datetimeFigureOut">
               <a:rPr lang="en-GB" smtClean="0"/>
-              <a:t>20/07/2022</a:t>
+              <a:t>22/07/2022</a:t>
             </a:fld>
             <a:endParaRPr lang="en-GB"/>
           </a:p>
@@ -8945,7 +9729,7 @@
           <a:p>
             <a:fld id="{E431324F-7260-48F1-BC87-E46D587744FD}" type="slidenum">
               <a:rPr lang="en-GB" smtClean="0"/>
-              <a:t>‹#›</a:t>
+              <a:t>‹N›</a:t>
             </a:fld>
             <a:endParaRPr lang="en-GB"/>
           </a:p>
@@ -9180,7 +9964,7 @@
           <a:p>
             <a:fld id="{B80D15F6-78EE-4630-AC5E-09BE10AE3EAA}" type="datetimeFigureOut">
               <a:rPr lang="en-GB" smtClean="0"/>
-              <a:t>20/07/2022</a:t>
+              <a:t>22/07/2022</a:t>
             </a:fld>
             <a:endParaRPr lang="en-GB"/>
           </a:p>
@@ -9222,7 +10006,7 @@
           <a:p>
             <a:fld id="{E431324F-7260-48F1-BC87-E46D587744FD}" type="slidenum">
               <a:rPr lang="en-GB" smtClean="0"/>
-              <a:t>‹#›</a:t>
+              <a:t>‹N›</a:t>
             </a:fld>
             <a:endParaRPr lang="en-GB"/>
           </a:p>
@@ -9437,7 +10221,7 @@
           <a:p>
             <a:fld id="{B80D15F6-78EE-4630-AC5E-09BE10AE3EAA}" type="datetimeFigureOut">
               <a:rPr lang="en-GB" smtClean="0"/>
-              <a:t>20/07/2022</a:t>
+              <a:t>22/07/2022</a:t>
             </a:fld>
             <a:endParaRPr lang="en-GB"/>
           </a:p>
@@ -9479,7 +10263,7 @@
           <a:p>
             <a:fld id="{E431324F-7260-48F1-BC87-E46D587744FD}" type="slidenum">
               <a:rPr lang="en-GB" smtClean="0"/>
-              <a:t>‹#›</a:t>
+              <a:t>‹N›</a:t>
             </a:fld>
             <a:endParaRPr lang="en-GB"/>
           </a:p>
@@ -9650,7 +10434,7 @@
           <a:p>
             <a:fld id="{B80D15F6-78EE-4630-AC5E-09BE10AE3EAA}" type="datetimeFigureOut">
               <a:rPr lang="en-GB" smtClean="0"/>
-              <a:t>20/07/2022</a:t>
+              <a:t>22/07/2022</a:t>
             </a:fld>
             <a:endParaRPr lang="en-GB"/>
           </a:p>
@@ -9728,7 +10512,7 @@
           <a:p>
             <a:fld id="{E431324F-7260-48F1-BC87-E46D587744FD}" type="slidenum">
               <a:rPr lang="en-GB" smtClean="0"/>
-              <a:t>‹#›</a:t>
+              <a:t>‹N›</a:t>
             </a:fld>
             <a:endParaRPr lang="en-GB"/>
           </a:p>
@@ -10069,7 +10853,7 @@
         </p:nvSpPr>
         <p:spPr>
           <a:xfrm>
-            <a:off x="68996" y="418726"/>
+            <a:off x="68996" y="457211"/>
             <a:ext cx="6703754" cy="215444"/>
           </a:xfrm>
           <a:prstGeom prst="rect">
@@ -10118,7 +10902,7 @@
         </p:blipFill>
         <p:spPr>
           <a:xfrm>
-            <a:off x="65503" y="727638"/>
+            <a:off x="65503" y="766123"/>
             <a:ext cx="1359336" cy="1008000"/>
           </a:xfrm>
           <a:prstGeom prst="rect">
@@ -10153,7 +10937,7 @@
         </p:blipFill>
         <p:spPr>
           <a:xfrm>
-            <a:off x="3483030" y="727638"/>
+            <a:off x="3483030" y="766123"/>
             <a:ext cx="1359336" cy="1008000"/>
           </a:xfrm>
           <a:prstGeom prst="rect">
@@ -10188,7 +10972,7 @@
         </p:blipFill>
         <p:spPr>
           <a:xfrm>
-            <a:off x="65503" y="2444173"/>
+            <a:off x="65503" y="2482658"/>
             <a:ext cx="1359336" cy="1008000"/>
           </a:xfrm>
           <a:prstGeom prst="rect">
@@ -10223,7 +11007,7 @@
         </p:blipFill>
         <p:spPr>
           <a:xfrm>
-            <a:off x="3483030" y="2444173"/>
+            <a:off x="3483030" y="2482658"/>
             <a:ext cx="1359336" cy="1008000"/>
           </a:xfrm>
           <a:prstGeom prst="rect">
@@ -10258,7 +11042,7 @@
         </p:blipFill>
         <p:spPr>
           <a:xfrm>
-            <a:off x="65503" y="4163025"/>
+            <a:off x="65503" y="4201510"/>
             <a:ext cx="1359336" cy="1008000"/>
           </a:xfrm>
           <a:prstGeom prst="rect">
@@ -10293,7 +11077,7 @@
         </p:blipFill>
         <p:spPr>
           <a:xfrm>
-            <a:off x="3483030" y="4163025"/>
+            <a:off x="3483030" y="4201510"/>
             <a:ext cx="1359336" cy="1008000"/>
           </a:xfrm>
           <a:prstGeom prst="rect">
@@ -10317,7 +11101,7 @@
         </p:nvCxnSpPr>
         <p:spPr>
           <a:xfrm>
-            <a:off x="148223" y="126772"/>
+            <a:off x="148223" y="197731"/>
             <a:ext cx="72000" cy="0"/>
           </a:xfrm>
           <a:prstGeom prst="line">
@@ -10358,7 +11142,7 @@
         </p:nvSpPr>
         <p:spPr>
           <a:xfrm>
-            <a:off x="167273" y="19050"/>
+            <a:off x="167273" y="90009"/>
             <a:ext cx="1135548" cy="215444"/>
           </a:xfrm>
           <a:prstGeom prst="rect">
@@ -10382,7 +11166,7 @@
             </a:r>
             <a:r>
               <a:rPr lang="en-GB" sz="800" dirty="0"/>
-              <a:t> percentile</a:t>
+              <a:t> perc</a:t>
             </a:r>
           </a:p>
         </p:txBody>
@@ -10403,7 +11187,7 @@
         </p:nvCxnSpPr>
         <p:spPr>
           <a:xfrm>
-            <a:off x="1123435" y="126772"/>
+            <a:off x="1123435" y="197731"/>
             <a:ext cx="72000" cy="0"/>
           </a:xfrm>
           <a:prstGeom prst="line">
@@ -10444,7 +11228,7 @@
         </p:nvSpPr>
         <p:spPr>
           <a:xfrm>
-            <a:off x="1140548" y="19050"/>
+            <a:off x="1140548" y="90009"/>
             <a:ext cx="1135548" cy="215444"/>
           </a:xfrm>
           <a:prstGeom prst="rect">
@@ -10468,7 +11252,7 @@
             </a:r>
             <a:r>
               <a:rPr lang="en-GB" sz="800" dirty="0"/>
-              <a:t> percentile</a:t>
+              <a:t> perc</a:t>
             </a:r>
           </a:p>
         </p:txBody>
@@ -10489,7 +11273,7 @@
         </p:nvCxnSpPr>
         <p:spPr>
           <a:xfrm>
-            <a:off x="2098647" y="126772"/>
+            <a:off x="2098647" y="197731"/>
             <a:ext cx="72000" cy="0"/>
           </a:xfrm>
           <a:prstGeom prst="line">
@@ -10530,7 +11314,7 @@
         </p:nvSpPr>
         <p:spPr>
           <a:xfrm>
-            <a:off x="2113823" y="19050"/>
+            <a:off x="2113823" y="90009"/>
             <a:ext cx="1135548" cy="215444"/>
           </a:xfrm>
           <a:prstGeom prst="rect">
@@ -10554,7 +11338,7 @@
             </a:r>
             <a:r>
               <a:rPr lang="en-GB" sz="800" dirty="0"/>
-              <a:t> percentile</a:t>
+              <a:t> perc</a:t>
             </a:r>
           </a:p>
         </p:txBody>
@@ -10575,7 +11359,7 @@
         </p:nvCxnSpPr>
         <p:spPr>
           <a:xfrm>
-            <a:off x="3073859" y="126772"/>
+            <a:off x="3073859" y="197731"/>
             <a:ext cx="72000" cy="0"/>
           </a:xfrm>
           <a:prstGeom prst="line">
@@ -10616,7 +11400,7 @@
         </p:nvSpPr>
         <p:spPr>
           <a:xfrm>
-            <a:off x="3087098" y="19050"/>
+            <a:off x="3087098" y="90009"/>
             <a:ext cx="1135548" cy="215444"/>
           </a:xfrm>
           <a:prstGeom prst="rect">
@@ -10640,7 +11424,7 @@
             </a:r>
             <a:r>
               <a:rPr lang="en-GB" sz="800" dirty="0"/>
-              <a:t> percentile</a:t>
+              <a:t> perc</a:t>
             </a:r>
           </a:p>
         </p:txBody>
@@ -10661,7 +11445,7 @@
         </p:nvCxnSpPr>
         <p:spPr>
           <a:xfrm>
-            <a:off x="4049071" y="126772"/>
+            <a:off x="4049071" y="197731"/>
             <a:ext cx="72000" cy="0"/>
           </a:xfrm>
           <a:prstGeom prst="line">
@@ -10702,7 +11486,7 @@
         </p:nvSpPr>
         <p:spPr>
           <a:xfrm>
-            <a:off x="4060373" y="19050"/>
+            <a:off x="4060373" y="90009"/>
             <a:ext cx="1135548" cy="215444"/>
           </a:xfrm>
           <a:prstGeom prst="rect">
@@ -10726,7 +11510,7 @@
             </a:r>
             <a:r>
               <a:rPr lang="en-GB" sz="800" dirty="0"/>
-              <a:t> percentile</a:t>
+              <a:t> perc</a:t>
             </a:r>
           </a:p>
         </p:txBody>
@@ -10747,7 +11531,7 @@
         </p:nvCxnSpPr>
         <p:spPr>
           <a:xfrm>
-            <a:off x="5024283" y="126772"/>
+            <a:off x="5024283" y="197731"/>
             <a:ext cx="72000" cy="0"/>
           </a:xfrm>
           <a:prstGeom prst="line">
@@ -10788,7 +11572,7 @@
         </p:nvSpPr>
         <p:spPr>
           <a:xfrm>
-            <a:off x="5033648" y="19050"/>
+            <a:off x="5033648" y="90009"/>
             <a:ext cx="1135548" cy="215444"/>
           </a:xfrm>
           <a:prstGeom prst="rect">
@@ -10812,7 +11596,7 @@
             </a:r>
             <a:r>
               <a:rPr lang="en-GB" sz="800" dirty="0"/>
-              <a:t> percentile</a:t>
+              <a:t> perc</a:t>
             </a:r>
           </a:p>
         </p:txBody>
@@ -10833,7 +11617,7 @@
         </p:nvCxnSpPr>
         <p:spPr>
           <a:xfrm>
-            <a:off x="5999497" y="126772"/>
+            <a:off x="5999497" y="197731"/>
             <a:ext cx="72000" cy="0"/>
           </a:xfrm>
           <a:prstGeom prst="line">
@@ -10874,7 +11658,7 @@
         </p:nvSpPr>
         <p:spPr>
           <a:xfrm>
-            <a:off x="6006922" y="19050"/>
+            <a:off x="6006922" y="90009"/>
             <a:ext cx="1135548" cy="215444"/>
           </a:xfrm>
           <a:prstGeom prst="rect">
@@ -10898,7 +11682,7 @@
             </a:r>
             <a:r>
               <a:rPr lang="en-GB" sz="800" dirty="0"/>
-              <a:t> percentile</a:t>
+              <a:t> perc</a:t>
             </a:r>
           </a:p>
         </p:txBody>
@@ -10917,7 +11701,7 @@
         </p:nvSpPr>
         <p:spPr>
           <a:xfrm>
-            <a:off x="68996" y="217662"/>
+            <a:off x="68996" y="455478"/>
             <a:ext cx="3278627" cy="246221"/>
           </a:xfrm>
           <a:prstGeom prst="rect">
@@ -10953,7 +11737,7 @@
         </p:nvSpPr>
         <p:spPr>
           <a:xfrm>
-            <a:off x="3457947" y="217662"/>
+            <a:off x="3457947" y="455478"/>
             <a:ext cx="3278627" cy="246221"/>
           </a:xfrm>
           <a:prstGeom prst="rect">
@@ -10989,7 +11773,7 @@
         </p:nvGrpSpPr>
         <p:grpSpPr>
           <a:xfrm>
-            <a:off x="40420" y="621254"/>
+            <a:off x="40420" y="659739"/>
             <a:ext cx="3351013" cy="1476000"/>
             <a:chOff x="40420" y="773654"/>
             <a:chExt cx="3351013" cy="1476000"/>
@@ -11208,7 +11992,7 @@
         </p:nvGrpSpPr>
         <p:grpSpPr>
           <a:xfrm>
-            <a:off x="3457947" y="621254"/>
+            <a:off x="3457947" y="659739"/>
             <a:ext cx="3351013" cy="1476000"/>
             <a:chOff x="40420" y="773654"/>
             <a:chExt cx="3351013" cy="1476000"/>
@@ -11427,7 +12211,7 @@
         </p:nvSpPr>
         <p:spPr>
           <a:xfrm>
-            <a:off x="68996" y="2136640"/>
+            <a:off x="68996" y="2175125"/>
             <a:ext cx="6703754" cy="215444"/>
           </a:xfrm>
           <a:prstGeom prst="rect">
@@ -11463,7 +12247,7 @@
         </p:nvGrpSpPr>
         <p:grpSpPr>
           <a:xfrm>
-            <a:off x="40420" y="2344004"/>
+            <a:off x="40420" y="2382489"/>
             <a:ext cx="3351013" cy="1476000"/>
             <a:chOff x="40420" y="773654"/>
             <a:chExt cx="3351013" cy="1476000"/>
@@ -11682,7 +12466,7 @@
         </p:nvGrpSpPr>
         <p:grpSpPr>
           <a:xfrm>
-            <a:off x="3457947" y="2344004"/>
+            <a:off x="3457947" y="2382489"/>
             <a:ext cx="3351013" cy="1476000"/>
             <a:chOff x="40420" y="773654"/>
             <a:chExt cx="3351013" cy="1476000"/>
@@ -11901,7 +12685,7 @@
         </p:nvSpPr>
         <p:spPr>
           <a:xfrm>
-            <a:off x="68996" y="3851770"/>
+            <a:off x="68996" y="3890255"/>
             <a:ext cx="6703754" cy="215444"/>
           </a:xfrm>
           <a:prstGeom prst="rect">
@@ -11937,7 +12721,7 @@
         </p:nvGrpSpPr>
         <p:grpSpPr>
           <a:xfrm>
-            <a:off x="40420" y="4059134"/>
+            <a:off x="40420" y="4097619"/>
             <a:ext cx="3351013" cy="1476000"/>
             <a:chOff x="40420" y="773654"/>
             <a:chExt cx="3351013" cy="1476000"/>
@@ -12156,7 +12940,7 @@
         </p:nvGrpSpPr>
         <p:grpSpPr>
           <a:xfrm>
-            <a:off x="3457947" y="4059134"/>
+            <a:off x="3457947" y="4097619"/>
             <a:ext cx="3351013" cy="1476000"/>
             <a:chOff x="40420" y="773654"/>
             <a:chExt cx="3351013" cy="1476000"/>
@@ -12375,7 +13159,7 @@
         </p:nvSpPr>
         <p:spPr>
           <a:xfrm>
-            <a:off x="40420" y="1799844"/>
+            <a:off x="40420" y="1838329"/>
             <a:ext cx="234000" cy="234000"/>
           </a:xfrm>
           <a:prstGeom prst="rect">
@@ -12417,7 +13201,7 @@
         </p:nvSpPr>
         <p:spPr>
           <a:xfrm>
-            <a:off x="40420" y="3517996"/>
+            <a:off x="40420" y="3556481"/>
             <a:ext cx="234000" cy="215444"/>
           </a:xfrm>
           <a:prstGeom prst="rect">
@@ -12459,7 +13243,7 @@
         </p:nvSpPr>
         <p:spPr>
           <a:xfrm>
-            <a:off x="40420" y="5236753"/>
+            <a:off x="40420" y="5275238"/>
             <a:ext cx="234000" cy="215444"/>
           </a:xfrm>
           <a:prstGeom prst="rect">
@@ -12501,7 +13285,7 @@
         </p:nvSpPr>
         <p:spPr>
           <a:xfrm>
-            <a:off x="3457169" y="1804833"/>
+            <a:off x="3457169" y="1843318"/>
             <a:ext cx="234000" cy="215444"/>
           </a:xfrm>
           <a:prstGeom prst="rect">
@@ -12543,7 +13327,7 @@
         </p:nvSpPr>
         <p:spPr>
           <a:xfrm>
-            <a:off x="3457169" y="3522985"/>
+            <a:off x="3457169" y="3561470"/>
             <a:ext cx="234000" cy="215444"/>
           </a:xfrm>
           <a:prstGeom prst="rect">
@@ -12585,7 +13369,7 @@
         </p:nvSpPr>
         <p:spPr>
           <a:xfrm>
-            <a:off x="3457169" y="5241742"/>
+            <a:off x="3457169" y="5280227"/>
             <a:ext cx="234000" cy="215444"/>
           </a:xfrm>
           <a:prstGeom prst="rect">
@@ -12641,7 +13425,7 @@
         </p:blipFill>
         <p:spPr>
           <a:xfrm>
-            <a:off x="1513207" y="673180"/>
+            <a:off x="1513207" y="711665"/>
             <a:ext cx="1824695" cy="1368000"/>
           </a:xfrm>
           <a:prstGeom prst="rect">
@@ -12677,7 +13461,7 @@
         </p:blipFill>
         <p:spPr>
           <a:xfrm>
-            <a:off x="4937202" y="673180"/>
+            <a:off x="4937202" y="711665"/>
             <a:ext cx="1824695" cy="1368000"/>
           </a:xfrm>
           <a:prstGeom prst="rect">
@@ -12713,7 +13497,7 @@
         </p:blipFill>
         <p:spPr>
           <a:xfrm>
-            <a:off x="1513207" y="2398004"/>
+            <a:off x="1513207" y="2436489"/>
             <a:ext cx="1824695" cy="1368000"/>
           </a:xfrm>
           <a:prstGeom prst="rect">
@@ -12749,7 +13533,7 @@
         </p:blipFill>
         <p:spPr>
           <a:xfrm>
-            <a:off x="4937202" y="2398004"/>
+            <a:off x="4937202" y="2436489"/>
             <a:ext cx="1824695" cy="1368000"/>
           </a:xfrm>
           <a:prstGeom prst="rect">
@@ -12785,7 +13569,7 @@
         </p:blipFill>
         <p:spPr>
           <a:xfrm>
-            <a:off x="1513207" y="4117174"/>
+            <a:off x="1513207" y="4155659"/>
             <a:ext cx="1824695" cy="1368000"/>
           </a:xfrm>
           <a:prstGeom prst="rect">
@@ -12821,7 +13605,7 @@
         </p:blipFill>
         <p:spPr>
           <a:xfrm>
-            <a:off x="4937202" y="4117174"/>
+            <a:off x="4937202" y="4155659"/>
             <a:ext cx="1824695" cy="1368000"/>
           </a:xfrm>
           <a:prstGeom prst="rect">
@@ -12845,7 +13629,7 @@
         </p:nvCxnSpPr>
         <p:spPr>
           <a:xfrm>
-            <a:off x="1760909" y="1618048"/>
+            <a:off x="1760909" y="1612578"/>
             <a:ext cx="1404000" cy="0"/>
           </a:xfrm>
           <a:prstGeom prst="line">
@@ -12888,8 +13672,8 @@
         </p:nvSpPr>
         <p:spPr>
           <a:xfrm>
-            <a:off x="2336833" y="1579613"/>
-            <a:ext cx="907414" cy="215444"/>
+            <a:off x="2540881" y="1428079"/>
+            <a:ext cx="734586" cy="215444"/>
           </a:xfrm>
           <a:prstGeom prst="rect">
             <a:avLst/>
@@ -12910,7 +13694,7 @@
                   </a:schemeClr>
                 </a:solidFill>
               </a:rPr>
-              <a:t>75% FRs retained</a:t>
+              <a:t>Top 75% FRs</a:t>
             </a:r>
           </a:p>
         </p:txBody>
@@ -12931,7 +13715,7 @@
         </p:nvCxnSpPr>
         <p:spPr>
           <a:xfrm>
-            <a:off x="1755836" y="3341274"/>
+            <a:off x="1755836" y="3340567"/>
             <a:ext cx="1404000" cy="0"/>
           </a:xfrm>
           <a:prstGeom prst="line">
@@ -12960,47 +13744,6 @@
           </a:fontRef>
         </p:style>
       </p:cxnSp>
-      <p:sp>
-        <p:nvSpPr>
-          <p:cNvPr id="129" name="TextBox 128">
-            <a:extLst>
-              <a:ext uri="{FF2B5EF4-FFF2-40B4-BE49-F238E27FC236}">
-                <a16:creationId xmlns:a16="http://schemas.microsoft.com/office/drawing/2014/main" id="{D330A620-6087-45C6-85A5-31C145E300D8}"/>
-              </a:ext>
-            </a:extLst>
-          </p:cNvPr>
-          <p:cNvSpPr txBox="1"/>
-          <p:nvPr/>
-        </p:nvSpPr>
-        <p:spPr>
-          <a:xfrm>
-            <a:off x="2331760" y="3302839"/>
-            <a:ext cx="907414" cy="215444"/>
-          </a:xfrm>
-          <a:prstGeom prst="rect">
-            <a:avLst/>
-          </a:prstGeom>
-          <a:noFill/>
-        </p:spPr>
-        <p:txBody>
-          <a:bodyPr wrap="square" rtlCol="0">
-            <a:spAutoFit/>
-          </a:bodyPr>
-          <a:lstStyle/>
-          <a:p>
-            <a:r>
-              <a:rPr lang="en-GB" sz="800" dirty="0">
-                <a:solidFill>
-                  <a:schemeClr val="bg1">
-                    <a:lumMod val="50000"/>
-                  </a:schemeClr>
-                </a:solidFill>
-              </a:rPr>
-              <a:t>75% FRs retained</a:t>
-            </a:r>
-          </a:p>
-        </p:txBody>
-      </p:sp>
       <p:cxnSp>
         <p:nvCxnSpPr>
           <p:cNvPr id="130" name="Straight Connector 129">
@@ -13017,7 +13760,7 @@
         </p:nvCxnSpPr>
         <p:spPr>
           <a:xfrm>
-            <a:off x="1755836" y="5060031"/>
+            <a:off x="1755836" y="5059324"/>
             <a:ext cx="1404000" cy="0"/>
           </a:xfrm>
           <a:prstGeom prst="line">
@@ -13046,47 +13789,6 @@
           </a:fontRef>
         </p:style>
       </p:cxnSp>
-      <p:sp>
-        <p:nvSpPr>
-          <p:cNvPr id="131" name="TextBox 130">
-            <a:extLst>
-              <a:ext uri="{FF2B5EF4-FFF2-40B4-BE49-F238E27FC236}">
-                <a16:creationId xmlns:a16="http://schemas.microsoft.com/office/drawing/2014/main" id="{FFC23E94-3384-4A5C-BFF4-46E125061AEE}"/>
-              </a:ext>
-            </a:extLst>
-          </p:cNvPr>
-          <p:cNvSpPr txBox="1"/>
-          <p:nvPr/>
-        </p:nvSpPr>
-        <p:spPr>
-          <a:xfrm>
-            <a:off x="2331760" y="5021596"/>
-            <a:ext cx="907414" cy="215444"/>
-          </a:xfrm>
-          <a:prstGeom prst="rect">
-            <a:avLst/>
-          </a:prstGeom>
-          <a:noFill/>
-        </p:spPr>
-        <p:txBody>
-          <a:bodyPr wrap="square" rtlCol="0">
-            <a:spAutoFit/>
-          </a:bodyPr>
-          <a:lstStyle/>
-          <a:p>
-            <a:r>
-              <a:rPr lang="en-GB" sz="800" dirty="0">
-                <a:solidFill>
-                  <a:schemeClr val="bg1">
-                    <a:lumMod val="50000"/>
-                  </a:schemeClr>
-                </a:solidFill>
-              </a:rPr>
-              <a:t>75% FRs retained</a:t>
-            </a:r>
-          </a:p>
-        </p:txBody>
-      </p:sp>
       <p:cxnSp>
         <p:nvCxnSpPr>
           <p:cNvPr id="132" name="Straight Connector 131">
@@ -13103,7 +13805,7 @@
         </p:nvCxnSpPr>
         <p:spPr>
           <a:xfrm>
-            <a:off x="5184172" y="1618048"/>
+            <a:off x="5187438" y="1612578"/>
             <a:ext cx="1404000" cy="0"/>
           </a:xfrm>
           <a:prstGeom prst="line">
@@ -13132,47 +13834,6 @@
           </a:fontRef>
         </p:style>
       </p:cxnSp>
-      <p:sp>
-        <p:nvSpPr>
-          <p:cNvPr id="133" name="TextBox 132">
-            <a:extLst>
-              <a:ext uri="{FF2B5EF4-FFF2-40B4-BE49-F238E27FC236}">
-                <a16:creationId xmlns:a16="http://schemas.microsoft.com/office/drawing/2014/main" id="{2A4F0432-01E5-4A76-A408-08192B227F02}"/>
-              </a:ext>
-            </a:extLst>
-          </p:cNvPr>
-          <p:cNvSpPr txBox="1"/>
-          <p:nvPr/>
-        </p:nvSpPr>
-        <p:spPr>
-          <a:xfrm>
-            <a:off x="5755309" y="1579613"/>
-            <a:ext cx="907414" cy="215444"/>
-          </a:xfrm>
-          <a:prstGeom prst="rect">
-            <a:avLst/>
-          </a:prstGeom>
-          <a:noFill/>
-        </p:spPr>
-        <p:txBody>
-          <a:bodyPr wrap="square" rtlCol="0">
-            <a:spAutoFit/>
-          </a:bodyPr>
-          <a:lstStyle/>
-          <a:p>
-            <a:r>
-              <a:rPr lang="en-GB" sz="800" dirty="0">
-                <a:solidFill>
-                  <a:schemeClr val="bg1">
-                    <a:lumMod val="50000"/>
-                  </a:schemeClr>
-                </a:solidFill>
-              </a:rPr>
-              <a:t>75% FRs retained</a:t>
-            </a:r>
-          </a:p>
-        </p:txBody>
-      </p:sp>
       <p:cxnSp>
         <p:nvCxnSpPr>
           <p:cNvPr id="134" name="Straight Connector 133">
@@ -13189,7 +13850,7 @@
         </p:nvCxnSpPr>
         <p:spPr>
           <a:xfrm>
-            <a:off x="5179099" y="3341274"/>
+            <a:off x="5182365" y="3340567"/>
             <a:ext cx="1404000" cy="0"/>
           </a:xfrm>
           <a:prstGeom prst="line">
@@ -13218,47 +13879,6 @@
           </a:fontRef>
         </p:style>
       </p:cxnSp>
-      <p:sp>
-        <p:nvSpPr>
-          <p:cNvPr id="135" name="TextBox 134">
-            <a:extLst>
-              <a:ext uri="{FF2B5EF4-FFF2-40B4-BE49-F238E27FC236}">
-                <a16:creationId xmlns:a16="http://schemas.microsoft.com/office/drawing/2014/main" id="{16AFF4DD-7A8D-474F-BDC4-04324BCC516C}"/>
-              </a:ext>
-            </a:extLst>
-          </p:cNvPr>
-          <p:cNvSpPr txBox="1"/>
-          <p:nvPr/>
-        </p:nvSpPr>
-        <p:spPr>
-          <a:xfrm>
-            <a:off x="5750236" y="3302839"/>
-            <a:ext cx="907414" cy="215444"/>
-          </a:xfrm>
-          <a:prstGeom prst="rect">
-            <a:avLst/>
-          </a:prstGeom>
-          <a:noFill/>
-        </p:spPr>
-        <p:txBody>
-          <a:bodyPr wrap="square" rtlCol="0">
-            <a:spAutoFit/>
-          </a:bodyPr>
-          <a:lstStyle/>
-          <a:p>
-            <a:r>
-              <a:rPr lang="en-GB" sz="800" dirty="0">
-                <a:solidFill>
-                  <a:schemeClr val="bg1">
-                    <a:lumMod val="50000"/>
-                  </a:schemeClr>
-                </a:solidFill>
-              </a:rPr>
-              <a:t>75% FRs retained</a:t>
-            </a:r>
-          </a:p>
-        </p:txBody>
-      </p:sp>
       <p:cxnSp>
         <p:nvCxnSpPr>
           <p:cNvPr id="136" name="Straight Connector 135">
@@ -13275,7 +13895,7 @@
         </p:nvCxnSpPr>
         <p:spPr>
           <a:xfrm>
-            <a:off x="5179099" y="5060031"/>
+            <a:off x="5182365" y="5059324"/>
             <a:ext cx="1404000" cy="0"/>
           </a:xfrm>
           <a:prstGeom prst="line">
@@ -13304,12 +13924,98 @@
           </a:fontRef>
         </p:style>
       </p:cxnSp>
+      <p:cxnSp>
+        <p:nvCxnSpPr>
+          <p:cNvPr id="4" name="Connettore diritto 3">
+            <a:extLst>
+              <a:ext uri="{FF2B5EF4-FFF2-40B4-BE49-F238E27FC236}">
+                <a16:creationId xmlns:a16="http://schemas.microsoft.com/office/drawing/2014/main" id="{4E9DF774-6B5D-4F71-B2B3-9575862BEBF9}"/>
+              </a:ext>
+            </a:extLst>
+          </p:cNvPr>
+          <p:cNvCxnSpPr/>
+          <p:nvPr/>
+        </p:nvCxnSpPr>
+        <p:spPr>
+          <a:xfrm>
+            <a:off x="1884317" y="1617341"/>
+            <a:ext cx="0" cy="252000"/>
+          </a:xfrm>
+          <a:prstGeom prst="line">
+            <a:avLst/>
+          </a:prstGeom>
+          <a:ln>
+            <a:solidFill>
+              <a:schemeClr val="bg2">
+                <a:lumMod val="75000"/>
+              </a:schemeClr>
+            </a:solidFill>
+          </a:ln>
+        </p:spPr>
+        <p:style>
+          <a:lnRef idx="1">
+            <a:schemeClr val="accent1"/>
+          </a:lnRef>
+          <a:fillRef idx="0">
+            <a:schemeClr val="accent1"/>
+          </a:fillRef>
+          <a:effectRef idx="0">
+            <a:schemeClr val="accent1"/>
+          </a:effectRef>
+          <a:fontRef idx="minor">
+            <a:schemeClr val="tx1"/>
+          </a:fontRef>
+        </p:style>
+      </p:cxnSp>
+      <p:cxnSp>
+        <p:nvCxnSpPr>
+          <p:cNvPr id="84" name="Connettore diritto 83">
+            <a:extLst>
+              <a:ext uri="{FF2B5EF4-FFF2-40B4-BE49-F238E27FC236}">
+                <a16:creationId xmlns:a16="http://schemas.microsoft.com/office/drawing/2014/main" id="{1B5CB688-BF60-4EC4-8BC4-782744293B1C}"/>
+              </a:ext>
+            </a:extLst>
+          </p:cNvPr>
+          <p:cNvCxnSpPr/>
+          <p:nvPr/>
+        </p:nvCxnSpPr>
+        <p:spPr>
+          <a:xfrm>
+            <a:off x="2409008" y="1617341"/>
+            <a:ext cx="0" cy="252000"/>
+          </a:xfrm>
+          <a:prstGeom prst="line">
+            <a:avLst/>
+          </a:prstGeom>
+          <a:ln>
+            <a:solidFill>
+              <a:schemeClr val="bg2">
+                <a:lumMod val="75000"/>
+              </a:schemeClr>
+            </a:solidFill>
+          </a:ln>
+        </p:spPr>
+        <p:style>
+          <a:lnRef idx="1">
+            <a:schemeClr val="accent1"/>
+          </a:lnRef>
+          <a:fillRef idx="0">
+            <a:schemeClr val="accent1"/>
+          </a:fillRef>
+          <a:effectRef idx="0">
+            <a:schemeClr val="accent1"/>
+          </a:effectRef>
+          <a:fontRef idx="minor">
+            <a:schemeClr val="tx1"/>
+          </a:fontRef>
+        </p:style>
+      </p:cxnSp>
       <p:sp>
         <p:nvSpPr>
-          <p:cNvPr id="137" name="TextBox 136">
+          <p:cNvPr id="85" name="TextBox 125">
             <a:extLst>
               <a:ext uri="{FF2B5EF4-FFF2-40B4-BE49-F238E27FC236}">
-                <a16:creationId xmlns:a16="http://schemas.microsoft.com/office/drawing/2014/main" id="{FE050DCD-CC6A-41F3-8C19-0DAE53C0F3A7}"/>
+                <a16:creationId xmlns:a16="http://schemas.microsoft.com/office/drawing/2014/main" id="{4980A7A2-0F2A-4899-8EFA-7535DD820D2A}"/>
               </a:ext>
             </a:extLst>
           </p:cNvPr>
@@ -13318,8 +14024,8 @@
         </p:nvSpPr>
         <p:spPr>
           <a:xfrm>
-            <a:off x="5750236" y="5021596"/>
-            <a:ext cx="907414" cy="215444"/>
+            <a:off x="2540881" y="3160560"/>
+            <a:ext cx="734586" cy="215444"/>
           </a:xfrm>
           <a:prstGeom prst="rect">
             <a:avLst/>
@@ -13340,8 +14046,1452 @@
                   </a:schemeClr>
                 </a:solidFill>
               </a:rPr>
-              <a:t>75% FRs retained</a:t>
+              <a:t>Top 75% FRs</a:t>
             </a:r>
+          </a:p>
+        </p:txBody>
+      </p:sp>
+      <p:sp>
+        <p:nvSpPr>
+          <p:cNvPr id="86" name="TextBox 125">
+            <a:extLst>
+              <a:ext uri="{FF2B5EF4-FFF2-40B4-BE49-F238E27FC236}">
+                <a16:creationId xmlns:a16="http://schemas.microsoft.com/office/drawing/2014/main" id="{1CB17BD8-41CB-4412-927B-4784EC79E0A9}"/>
+              </a:ext>
+            </a:extLst>
+          </p:cNvPr>
+          <p:cNvSpPr txBox="1"/>
+          <p:nvPr/>
+        </p:nvSpPr>
+        <p:spPr>
+          <a:xfrm>
+            <a:off x="2540881" y="4878262"/>
+            <a:ext cx="734586" cy="215444"/>
+          </a:xfrm>
+          <a:prstGeom prst="rect">
+            <a:avLst/>
+          </a:prstGeom>
+          <a:noFill/>
+        </p:spPr>
+        <p:txBody>
+          <a:bodyPr wrap="square" rtlCol="0">
+            <a:spAutoFit/>
+          </a:bodyPr>
+          <a:lstStyle/>
+          <a:p>
+            <a:r>
+              <a:rPr lang="en-GB" sz="800" dirty="0">
+                <a:solidFill>
+                  <a:schemeClr val="bg1">
+                    <a:lumMod val="50000"/>
+                  </a:schemeClr>
+                </a:solidFill>
+              </a:rPr>
+              <a:t>Top 75% FRs</a:t>
+            </a:r>
+          </a:p>
+        </p:txBody>
+      </p:sp>
+      <p:sp>
+        <p:nvSpPr>
+          <p:cNvPr id="88" name="TextBox 125">
+            <a:extLst>
+              <a:ext uri="{FF2B5EF4-FFF2-40B4-BE49-F238E27FC236}">
+                <a16:creationId xmlns:a16="http://schemas.microsoft.com/office/drawing/2014/main" id="{03C51D11-02FF-475D-BFB7-1DF53A0E7123}"/>
+              </a:ext>
+            </a:extLst>
+          </p:cNvPr>
+          <p:cNvSpPr txBox="1"/>
+          <p:nvPr/>
+        </p:nvSpPr>
+        <p:spPr>
+          <a:xfrm>
+            <a:off x="5949767" y="1428079"/>
+            <a:ext cx="734586" cy="215444"/>
+          </a:xfrm>
+          <a:prstGeom prst="rect">
+            <a:avLst/>
+          </a:prstGeom>
+          <a:noFill/>
+        </p:spPr>
+        <p:txBody>
+          <a:bodyPr wrap="square" rtlCol="0">
+            <a:spAutoFit/>
+          </a:bodyPr>
+          <a:lstStyle/>
+          <a:p>
+            <a:r>
+              <a:rPr lang="en-GB" sz="800" dirty="0">
+                <a:solidFill>
+                  <a:schemeClr val="bg1">
+                    <a:lumMod val="50000"/>
+                  </a:schemeClr>
+                </a:solidFill>
+              </a:rPr>
+              <a:t>Top 75% FRs</a:t>
+            </a:r>
+          </a:p>
+        </p:txBody>
+      </p:sp>
+      <p:sp>
+        <p:nvSpPr>
+          <p:cNvPr id="89" name="TextBox 125">
+            <a:extLst>
+              <a:ext uri="{FF2B5EF4-FFF2-40B4-BE49-F238E27FC236}">
+                <a16:creationId xmlns:a16="http://schemas.microsoft.com/office/drawing/2014/main" id="{1C765805-96E1-4B3E-B89B-378130C3F354}"/>
+              </a:ext>
+            </a:extLst>
+          </p:cNvPr>
+          <p:cNvSpPr txBox="1"/>
+          <p:nvPr/>
+        </p:nvSpPr>
+        <p:spPr>
+          <a:xfrm>
+            <a:off x="5949767" y="3160560"/>
+            <a:ext cx="734586" cy="215444"/>
+          </a:xfrm>
+          <a:prstGeom prst="rect">
+            <a:avLst/>
+          </a:prstGeom>
+          <a:noFill/>
+        </p:spPr>
+        <p:txBody>
+          <a:bodyPr wrap="square" rtlCol="0">
+            <a:spAutoFit/>
+          </a:bodyPr>
+          <a:lstStyle/>
+          <a:p>
+            <a:r>
+              <a:rPr lang="en-GB" sz="800" dirty="0">
+                <a:solidFill>
+                  <a:schemeClr val="bg1">
+                    <a:lumMod val="50000"/>
+                  </a:schemeClr>
+                </a:solidFill>
+              </a:rPr>
+              <a:t>Top 75% FRs</a:t>
+            </a:r>
+          </a:p>
+        </p:txBody>
+      </p:sp>
+      <p:sp>
+        <p:nvSpPr>
+          <p:cNvPr id="90" name="TextBox 125">
+            <a:extLst>
+              <a:ext uri="{FF2B5EF4-FFF2-40B4-BE49-F238E27FC236}">
+                <a16:creationId xmlns:a16="http://schemas.microsoft.com/office/drawing/2014/main" id="{43602DDF-4FE9-434B-BF0A-57DD785A5592}"/>
+              </a:ext>
+            </a:extLst>
+          </p:cNvPr>
+          <p:cNvSpPr txBox="1"/>
+          <p:nvPr/>
+        </p:nvSpPr>
+        <p:spPr>
+          <a:xfrm>
+            <a:off x="5949767" y="4878262"/>
+            <a:ext cx="734586" cy="215444"/>
+          </a:xfrm>
+          <a:prstGeom prst="rect">
+            <a:avLst/>
+          </a:prstGeom>
+          <a:noFill/>
+        </p:spPr>
+        <p:txBody>
+          <a:bodyPr wrap="square" rtlCol="0">
+            <a:spAutoFit/>
+          </a:bodyPr>
+          <a:lstStyle/>
+          <a:p>
+            <a:r>
+              <a:rPr lang="en-GB" sz="800" dirty="0">
+                <a:solidFill>
+                  <a:schemeClr val="bg1">
+                    <a:lumMod val="50000"/>
+                  </a:schemeClr>
+                </a:solidFill>
+              </a:rPr>
+              <a:t>Top 75% FRs</a:t>
+            </a:r>
+          </a:p>
+        </p:txBody>
+      </p:sp>
+      <p:sp>
+        <p:nvSpPr>
+          <p:cNvPr id="5" name="Ovale 4">
+            <a:extLst>
+              <a:ext uri="{FF2B5EF4-FFF2-40B4-BE49-F238E27FC236}">
+                <a16:creationId xmlns:a16="http://schemas.microsoft.com/office/drawing/2014/main" id="{1E79C216-D4FF-40DD-8B6E-58021D6B7F96}"/>
+              </a:ext>
+            </a:extLst>
+          </p:cNvPr>
+          <p:cNvSpPr/>
+          <p:nvPr/>
+        </p:nvSpPr>
+        <p:spPr>
+          <a:xfrm>
+            <a:off x="2391339" y="1850055"/>
+            <a:ext cx="36000" cy="36000"/>
+          </a:xfrm>
+          <a:prstGeom prst="ellipse">
+            <a:avLst/>
+          </a:prstGeom>
+          <a:solidFill>
+            <a:srgbClr val="D95319"/>
+          </a:solidFill>
+          <a:ln>
+            <a:noFill/>
+          </a:ln>
+        </p:spPr>
+        <p:style>
+          <a:lnRef idx="2">
+            <a:schemeClr val="accent1">
+              <a:shade val="50000"/>
+            </a:schemeClr>
+          </a:lnRef>
+          <a:fillRef idx="1">
+            <a:schemeClr val="accent1"/>
+          </a:fillRef>
+          <a:effectRef idx="0">
+            <a:schemeClr val="accent1"/>
+          </a:effectRef>
+          <a:fontRef idx="minor">
+            <a:schemeClr val="lt1"/>
+          </a:fontRef>
+        </p:style>
+        <p:txBody>
+          <a:bodyPr rtlCol="0" anchor="ctr"/>
+          <a:lstStyle/>
+          <a:p>
+            <a:pPr algn="ctr"/>
+            <a:endParaRPr lang="en-GB"/>
+          </a:p>
+        </p:txBody>
+      </p:sp>
+      <p:sp>
+        <p:nvSpPr>
+          <p:cNvPr id="93" name="Ovale 92">
+            <a:extLst>
+              <a:ext uri="{FF2B5EF4-FFF2-40B4-BE49-F238E27FC236}">
+                <a16:creationId xmlns:a16="http://schemas.microsoft.com/office/drawing/2014/main" id="{38C1B801-8BE9-41ED-B7B7-44DCC2CD309C}"/>
+              </a:ext>
+            </a:extLst>
+          </p:cNvPr>
+          <p:cNvSpPr/>
+          <p:nvPr/>
+        </p:nvSpPr>
+        <p:spPr>
+          <a:xfrm>
+            <a:off x="1869024" y="1850055"/>
+            <a:ext cx="36000" cy="36000"/>
+          </a:xfrm>
+          <a:prstGeom prst="ellipse">
+            <a:avLst/>
+          </a:prstGeom>
+          <a:solidFill>
+            <a:srgbClr val="7E2F8E"/>
+          </a:solidFill>
+          <a:ln>
+            <a:noFill/>
+          </a:ln>
+        </p:spPr>
+        <p:style>
+          <a:lnRef idx="2">
+            <a:schemeClr val="accent1">
+              <a:shade val="50000"/>
+            </a:schemeClr>
+          </a:lnRef>
+          <a:fillRef idx="1">
+            <a:schemeClr val="accent1"/>
+          </a:fillRef>
+          <a:effectRef idx="0">
+            <a:schemeClr val="accent1"/>
+          </a:effectRef>
+          <a:fontRef idx="minor">
+            <a:schemeClr val="lt1"/>
+          </a:fontRef>
+        </p:style>
+        <p:txBody>
+          <a:bodyPr rtlCol="0" anchor="ctr"/>
+          <a:lstStyle/>
+          <a:p>
+            <a:pPr algn="ctr"/>
+            <a:endParaRPr lang="en-GB"/>
+          </a:p>
+        </p:txBody>
+      </p:sp>
+      <p:sp>
+        <p:nvSpPr>
+          <p:cNvPr id="96" name="Ovale 95">
+            <a:extLst>
+              <a:ext uri="{FF2B5EF4-FFF2-40B4-BE49-F238E27FC236}">
+                <a16:creationId xmlns:a16="http://schemas.microsoft.com/office/drawing/2014/main" id="{E385D1B4-F190-430E-9C3B-68819046A583}"/>
+              </a:ext>
+            </a:extLst>
+          </p:cNvPr>
+          <p:cNvSpPr/>
+          <p:nvPr/>
+        </p:nvSpPr>
+        <p:spPr>
+          <a:xfrm>
+            <a:off x="1907250" y="336395"/>
+            <a:ext cx="72000" cy="72000"/>
+          </a:xfrm>
+          <a:prstGeom prst="ellipse">
+            <a:avLst/>
+          </a:prstGeom>
+          <a:solidFill>
+            <a:srgbClr val="7E2F8E"/>
+          </a:solidFill>
+          <a:ln>
+            <a:noFill/>
+          </a:ln>
+        </p:spPr>
+        <p:style>
+          <a:lnRef idx="2">
+            <a:schemeClr val="accent1">
+              <a:shade val="50000"/>
+            </a:schemeClr>
+          </a:lnRef>
+          <a:fillRef idx="1">
+            <a:schemeClr val="accent1"/>
+          </a:fillRef>
+          <a:effectRef idx="0">
+            <a:schemeClr val="accent1"/>
+          </a:effectRef>
+          <a:fontRef idx="minor">
+            <a:schemeClr val="lt1"/>
+          </a:fontRef>
+        </p:style>
+        <p:txBody>
+          <a:bodyPr rtlCol="0" anchor="ctr"/>
+          <a:lstStyle/>
+          <a:p>
+            <a:pPr algn="ctr"/>
+            <a:endParaRPr lang="en-GB"/>
+          </a:p>
+        </p:txBody>
+      </p:sp>
+      <p:sp>
+        <p:nvSpPr>
+          <p:cNvPr id="97" name="Ovale 96">
+            <a:extLst>
+              <a:ext uri="{FF2B5EF4-FFF2-40B4-BE49-F238E27FC236}">
+                <a16:creationId xmlns:a16="http://schemas.microsoft.com/office/drawing/2014/main" id="{B77B2DFE-46E7-4BF1-B03A-F614C98895F9}"/>
+              </a:ext>
+            </a:extLst>
+          </p:cNvPr>
+          <p:cNvSpPr/>
+          <p:nvPr/>
+        </p:nvSpPr>
+        <p:spPr>
+          <a:xfrm>
+            <a:off x="5825155" y="336395"/>
+            <a:ext cx="72000" cy="72000"/>
+          </a:xfrm>
+          <a:prstGeom prst="ellipse">
+            <a:avLst/>
+          </a:prstGeom>
+          <a:solidFill>
+            <a:srgbClr val="D95319"/>
+          </a:solidFill>
+          <a:ln>
+            <a:noFill/>
+          </a:ln>
+        </p:spPr>
+        <p:style>
+          <a:lnRef idx="2">
+            <a:schemeClr val="accent1">
+              <a:shade val="50000"/>
+            </a:schemeClr>
+          </a:lnRef>
+          <a:fillRef idx="1">
+            <a:schemeClr val="accent1"/>
+          </a:fillRef>
+          <a:effectRef idx="0">
+            <a:schemeClr val="accent1"/>
+          </a:effectRef>
+          <a:fontRef idx="minor">
+            <a:schemeClr val="lt1"/>
+          </a:fontRef>
+        </p:style>
+        <p:txBody>
+          <a:bodyPr rtlCol="0" anchor="ctr"/>
+          <a:lstStyle/>
+          <a:p>
+            <a:pPr algn="ctr"/>
+            <a:endParaRPr lang="en-GB"/>
+          </a:p>
+        </p:txBody>
+      </p:sp>
+      <p:sp>
+        <p:nvSpPr>
+          <p:cNvPr id="98" name="TextBox 353">
+            <a:extLst>
+              <a:ext uri="{FF2B5EF4-FFF2-40B4-BE49-F238E27FC236}">
+                <a16:creationId xmlns:a16="http://schemas.microsoft.com/office/drawing/2014/main" id="{83E1012D-20AB-4F01-8AA8-F5DF94165F99}"/>
+              </a:ext>
+            </a:extLst>
+          </p:cNvPr>
+          <p:cNvSpPr txBox="1"/>
+          <p:nvPr/>
+        </p:nvSpPr>
+        <p:spPr>
+          <a:xfrm>
+            <a:off x="1947022" y="265956"/>
+            <a:ext cx="1135548" cy="215444"/>
+          </a:xfrm>
+          <a:prstGeom prst="rect">
+            <a:avLst/>
+          </a:prstGeom>
+          <a:noFill/>
+        </p:spPr>
+        <p:txBody>
+          <a:bodyPr wrap="square" rtlCol="0">
+            <a:spAutoFit/>
+          </a:bodyPr>
+          <a:lstStyle/>
+          <a:p>
+            <a:r>
+              <a:rPr lang="en-GB" sz="800" dirty="0"/>
+              <a:t>VRE for 85</a:t>
+            </a:r>
+            <a:r>
+              <a:rPr lang="en-GB" sz="800" baseline="30000" dirty="0"/>
+              <a:t>th</a:t>
+            </a:r>
+            <a:r>
+              <a:rPr lang="en-GB" sz="800" dirty="0"/>
+              <a:t> perc</a:t>
+            </a:r>
+          </a:p>
+        </p:txBody>
+      </p:sp>
+      <p:sp>
+        <p:nvSpPr>
+          <p:cNvPr id="99" name="TextBox 353">
+            <a:extLst>
+              <a:ext uri="{FF2B5EF4-FFF2-40B4-BE49-F238E27FC236}">
+                <a16:creationId xmlns:a16="http://schemas.microsoft.com/office/drawing/2014/main" id="{20445A9D-DBC2-44F9-BE59-F0EABCC19B4E}"/>
+              </a:ext>
+            </a:extLst>
+          </p:cNvPr>
+          <p:cNvSpPr txBox="1"/>
+          <p:nvPr/>
+        </p:nvSpPr>
+        <p:spPr>
+          <a:xfrm>
+            <a:off x="5865597" y="271683"/>
+            <a:ext cx="1135548" cy="215444"/>
+          </a:xfrm>
+          <a:prstGeom prst="rect">
+            <a:avLst/>
+          </a:prstGeom>
+          <a:noFill/>
+        </p:spPr>
+        <p:txBody>
+          <a:bodyPr wrap="square" rtlCol="0">
+            <a:spAutoFit/>
+          </a:bodyPr>
+          <a:lstStyle/>
+          <a:p>
+            <a:r>
+              <a:rPr lang="en-GB" sz="800" dirty="0"/>
+              <a:t>VRE for 99</a:t>
+            </a:r>
+            <a:r>
+              <a:rPr lang="en-GB" sz="800" baseline="30000" dirty="0"/>
+              <a:t>th</a:t>
+            </a:r>
+            <a:r>
+              <a:rPr lang="en-GB" sz="800" dirty="0"/>
+              <a:t> perc</a:t>
+            </a:r>
+          </a:p>
+        </p:txBody>
+      </p:sp>
+      <p:sp>
+        <p:nvSpPr>
+          <p:cNvPr id="100" name="TextBox 349">
+            <a:extLst>
+              <a:ext uri="{FF2B5EF4-FFF2-40B4-BE49-F238E27FC236}">
+                <a16:creationId xmlns:a16="http://schemas.microsoft.com/office/drawing/2014/main" id="{18FA9629-D01E-4B95-BA29-1A87AC866A24}"/>
+              </a:ext>
+            </a:extLst>
+          </p:cNvPr>
+          <p:cNvSpPr txBox="1"/>
+          <p:nvPr/>
+        </p:nvSpPr>
+        <p:spPr>
+          <a:xfrm>
+            <a:off x="0" y="-23871"/>
+            <a:ext cx="6858000" cy="213792"/>
+          </a:xfrm>
+          <a:prstGeom prst="rect">
+            <a:avLst/>
+          </a:prstGeom>
+          <a:noFill/>
+        </p:spPr>
+        <p:txBody>
+          <a:bodyPr wrap="square" rtlCol="0">
+            <a:spAutoFit/>
+          </a:bodyPr>
+          <a:lstStyle/>
+          <a:p>
+            <a:pPr algn="ctr"/>
+            <a:r>
+              <a:rPr lang="en-GB" sz="800" dirty="0"/>
+              <a:t>Percentiles extracted from the distribution of ecPoint-Rainfall forecasts for each FR</a:t>
+            </a:r>
+          </a:p>
+        </p:txBody>
+      </p:sp>
+      <p:cxnSp>
+        <p:nvCxnSpPr>
+          <p:cNvPr id="103" name="Connettore diritto 102">
+            <a:extLst>
+              <a:ext uri="{FF2B5EF4-FFF2-40B4-BE49-F238E27FC236}">
+                <a16:creationId xmlns:a16="http://schemas.microsoft.com/office/drawing/2014/main" id="{0F4A7DAB-E7ED-4D3F-960A-81CD2309CF25}"/>
+              </a:ext>
+            </a:extLst>
+          </p:cNvPr>
+          <p:cNvCxnSpPr/>
+          <p:nvPr/>
+        </p:nvCxnSpPr>
+        <p:spPr>
+          <a:xfrm>
+            <a:off x="2461109" y="3338451"/>
+            <a:ext cx="0" cy="252000"/>
+          </a:xfrm>
+          <a:prstGeom prst="line">
+            <a:avLst/>
+          </a:prstGeom>
+          <a:ln>
+            <a:solidFill>
+              <a:schemeClr val="bg2">
+                <a:lumMod val="75000"/>
+              </a:schemeClr>
+            </a:solidFill>
+          </a:ln>
+        </p:spPr>
+        <p:style>
+          <a:lnRef idx="1">
+            <a:schemeClr val="accent1"/>
+          </a:lnRef>
+          <a:fillRef idx="0">
+            <a:schemeClr val="accent1"/>
+          </a:fillRef>
+          <a:effectRef idx="0">
+            <a:schemeClr val="accent1"/>
+          </a:effectRef>
+          <a:fontRef idx="minor">
+            <a:schemeClr val="tx1"/>
+          </a:fontRef>
+        </p:style>
+      </p:cxnSp>
+      <p:sp>
+        <p:nvSpPr>
+          <p:cNvPr id="109" name="Ovale 108">
+            <a:extLst>
+              <a:ext uri="{FF2B5EF4-FFF2-40B4-BE49-F238E27FC236}">
+                <a16:creationId xmlns:a16="http://schemas.microsoft.com/office/drawing/2014/main" id="{6BC9434B-B71F-4324-A16E-320D4DD34F09}"/>
+              </a:ext>
+            </a:extLst>
+          </p:cNvPr>
+          <p:cNvSpPr/>
+          <p:nvPr/>
+        </p:nvSpPr>
+        <p:spPr>
+          <a:xfrm>
+            <a:off x="2443440" y="3571165"/>
+            <a:ext cx="36000" cy="36000"/>
+          </a:xfrm>
+          <a:prstGeom prst="ellipse">
+            <a:avLst/>
+          </a:prstGeom>
+          <a:solidFill>
+            <a:srgbClr val="D95319"/>
+          </a:solidFill>
+          <a:ln>
+            <a:noFill/>
+          </a:ln>
+        </p:spPr>
+        <p:style>
+          <a:lnRef idx="2">
+            <a:schemeClr val="accent1">
+              <a:shade val="50000"/>
+            </a:schemeClr>
+          </a:lnRef>
+          <a:fillRef idx="1">
+            <a:schemeClr val="accent1"/>
+          </a:fillRef>
+          <a:effectRef idx="0">
+            <a:schemeClr val="accent1"/>
+          </a:effectRef>
+          <a:fontRef idx="minor">
+            <a:schemeClr val="lt1"/>
+          </a:fontRef>
+        </p:style>
+        <p:txBody>
+          <a:bodyPr rtlCol="0" anchor="ctr"/>
+          <a:lstStyle/>
+          <a:p>
+            <a:pPr algn="ctr"/>
+            <a:endParaRPr lang="en-GB"/>
+          </a:p>
+        </p:txBody>
+      </p:sp>
+      <p:cxnSp>
+        <p:nvCxnSpPr>
+          <p:cNvPr id="110" name="Connettore diritto 109">
+            <a:extLst>
+              <a:ext uri="{FF2B5EF4-FFF2-40B4-BE49-F238E27FC236}">
+                <a16:creationId xmlns:a16="http://schemas.microsoft.com/office/drawing/2014/main" id="{4704B757-9678-47A0-81C5-745A92CB8432}"/>
+              </a:ext>
+            </a:extLst>
+          </p:cNvPr>
+          <p:cNvCxnSpPr/>
+          <p:nvPr/>
+        </p:nvCxnSpPr>
+        <p:spPr>
+          <a:xfrm>
+            <a:off x="2357295" y="5062893"/>
+            <a:ext cx="0" cy="252000"/>
+          </a:xfrm>
+          <a:prstGeom prst="line">
+            <a:avLst/>
+          </a:prstGeom>
+          <a:ln>
+            <a:solidFill>
+              <a:schemeClr val="bg2">
+                <a:lumMod val="75000"/>
+              </a:schemeClr>
+            </a:solidFill>
+          </a:ln>
+        </p:spPr>
+        <p:style>
+          <a:lnRef idx="1">
+            <a:schemeClr val="accent1"/>
+          </a:lnRef>
+          <a:fillRef idx="0">
+            <a:schemeClr val="accent1"/>
+          </a:fillRef>
+          <a:effectRef idx="0">
+            <a:schemeClr val="accent1"/>
+          </a:effectRef>
+          <a:fontRef idx="minor">
+            <a:schemeClr val="tx1"/>
+          </a:fontRef>
+        </p:style>
+      </p:cxnSp>
+      <p:sp>
+        <p:nvSpPr>
+          <p:cNvPr id="111" name="Ovale 110">
+            <a:extLst>
+              <a:ext uri="{FF2B5EF4-FFF2-40B4-BE49-F238E27FC236}">
+                <a16:creationId xmlns:a16="http://schemas.microsoft.com/office/drawing/2014/main" id="{86C48127-6EC2-4090-88CA-6A1480DA6D9F}"/>
+              </a:ext>
+            </a:extLst>
+          </p:cNvPr>
+          <p:cNvSpPr/>
+          <p:nvPr/>
+        </p:nvSpPr>
+        <p:spPr>
+          <a:xfrm>
+            <a:off x="2339626" y="5295607"/>
+            <a:ext cx="36000" cy="36000"/>
+          </a:xfrm>
+          <a:prstGeom prst="ellipse">
+            <a:avLst/>
+          </a:prstGeom>
+          <a:solidFill>
+            <a:srgbClr val="D95319"/>
+          </a:solidFill>
+          <a:ln>
+            <a:noFill/>
+          </a:ln>
+        </p:spPr>
+        <p:style>
+          <a:lnRef idx="2">
+            <a:schemeClr val="accent1">
+              <a:shade val="50000"/>
+            </a:schemeClr>
+          </a:lnRef>
+          <a:fillRef idx="1">
+            <a:schemeClr val="accent1"/>
+          </a:fillRef>
+          <a:effectRef idx="0">
+            <a:schemeClr val="accent1"/>
+          </a:effectRef>
+          <a:fontRef idx="minor">
+            <a:schemeClr val="lt1"/>
+          </a:fontRef>
+        </p:style>
+        <p:txBody>
+          <a:bodyPr rtlCol="0" anchor="ctr"/>
+          <a:lstStyle/>
+          <a:p>
+            <a:pPr algn="ctr"/>
+            <a:endParaRPr lang="en-GB"/>
+          </a:p>
+        </p:txBody>
+      </p:sp>
+      <p:cxnSp>
+        <p:nvCxnSpPr>
+          <p:cNvPr id="112" name="Connettore diritto 111">
+            <a:extLst>
+              <a:ext uri="{FF2B5EF4-FFF2-40B4-BE49-F238E27FC236}">
+                <a16:creationId xmlns:a16="http://schemas.microsoft.com/office/drawing/2014/main" id="{7F6CBC28-CF54-43D9-A757-0D99352D58FC}"/>
+              </a:ext>
+            </a:extLst>
+          </p:cNvPr>
+          <p:cNvCxnSpPr/>
+          <p:nvPr/>
+        </p:nvCxnSpPr>
+        <p:spPr>
+          <a:xfrm>
+            <a:off x="5560504" y="1620708"/>
+            <a:ext cx="0" cy="252000"/>
+          </a:xfrm>
+          <a:prstGeom prst="line">
+            <a:avLst/>
+          </a:prstGeom>
+          <a:ln>
+            <a:solidFill>
+              <a:schemeClr val="bg2">
+                <a:lumMod val="75000"/>
+              </a:schemeClr>
+            </a:solidFill>
+          </a:ln>
+        </p:spPr>
+        <p:style>
+          <a:lnRef idx="1">
+            <a:schemeClr val="accent1"/>
+          </a:lnRef>
+          <a:fillRef idx="0">
+            <a:schemeClr val="accent1"/>
+          </a:fillRef>
+          <a:effectRef idx="0">
+            <a:schemeClr val="accent1"/>
+          </a:effectRef>
+          <a:fontRef idx="minor">
+            <a:schemeClr val="tx1"/>
+          </a:fontRef>
+        </p:style>
+      </p:cxnSp>
+      <p:sp>
+        <p:nvSpPr>
+          <p:cNvPr id="113" name="Ovale 112">
+            <a:extLst>
+              <a:ext uri="{FF2B5EF4-FFF2-40B4-BE49-F238E27FC236}">
+                <a16:creationId xmlns:a16="http://schemas.microsoft.com/office/drawing/2014/main" id="{0DC9380A-1902-4D73-8C20-374C9F539D71}"/>
+              </a:ext>
+            </a:extLst>
+          </p:cNvPr>
+          <p:cNvSpPr/>
+          <p:nvPr/>
+        </p:nvSpPr>
+        <p:spPr>
+          <a:xfrm>
+            <a:off x="5542835" y="1853422"/>
+            <a:ext cx="36000" cy="36000"/>
+          </a:xfrm>
+          <a:prstGeom prst="ellipse">
+            <a:avLst/>
+          </a:prstGeom>
+          <a:solidFill>
+            <a:srgbClr val="D95319"/>
+          </a:solidFill>
+          <a:ln>
+            <a:noFill/>
+          </a:ln>
+        </p:spPr>
+        <p:style>
+          <a:lnRef idx="2">
+            <a:schemeClr val="accent1">
+              <a:shade val="50000"/>
+            </a:schemeClr>
+          </a:lnRef>
+          <a:fillRef idx="1">
+            <a:schemeClr val="accent1"/>
+          </a:fillRef>
+          <a:effectRef idx="0">
+            <a:schemeClr val="accent1"/>
+          </a:effectRef>
+          <a:fontRef idx="minor">
+            <a:schemeClr val="lt1"/>
+          </a:fontRef>
+        </p:style>
+        <p:txBody>
+          <a:bodyPr rtlCol="0" anchor="ctr"/>
+          <a:lstStyle/>
+          <a:p>
+            <a:pPr algn="ctr"/>
+            <a:endParaRPr lang="en-GB"/>
+          </a:p>
+        </p:txBody>
+      </p:sp>
+      <p:cxnSp>
+        <p:nvCxnSpPr>
+          <p:cNvPr id="114" name="Connettore diritto 113">
+            <a:extLst>
+              <a:ext uri="{FF2B5EF4-FFF2-40B4-BE49-F238E27FC236}">
+                <a16:creationId xmlns:a16="http://schemas.microsoft.com/office/drawing/2014/main" id="{A64F48AB-EB8E-466C-80F0-0F0F50C79832}"/>
+              </a:ext>
+            </a:extLst>
+          </p:cNvPr>
+          <p:cNvCxnSpPr/>
+          <p:nvPr/>
+        </p:nvCxnSpPr>
+        <p:spPr>
+          <a:xfrm>
+            <a:off x="5542835" y="3341818"/>
+            <a:ext cx="0" cy="252000"/>
+          </a:xfrm>
+          <a:prstGeom prst="line">
+            <a:avLst/>
+          </a:prstGeom>
+          <a:ln>
+            <a:solidFill>
+              <a:schemeClr val="bg2">
+                <a:lumMod val="75000"/>
+              </a:schemeClr>
+            </a:solidFill>
+          </a:ln>
+        </p:spPr>
+        <p:style>
+          <a:lnRef idx="1">
+            <a:schemeClr val="accent1"/>
+          </a:lnRef>
+          <a:fillRef idx="0">
+            <a:schemeClr val="accent1"/>
+          </a:fillRef>
+          <a:effectRef idx="0">
+            <a:schemeClr val="accent1"/>
+          </a:effectRef>
+          <a:fontRef idx="minor">
+            <a:schemeClr val="tx1"/>
+          </a:fontRef>
+        </p:style>
+      </p:cxnSp>
+      <p:sp>
+        <p:nvSpPr>
+          <p:cNvPr id="115" name="Ovale 114">
+            <a:extLst>
+              <a:ext uri="{FF2B5EF4-FFF2-40B4-BE49-F238E27FC236}">
+                <a16:creationId xmlns:a16="http://schemas.microsoft.com/office/drawing/2014/main" id="{B82532E5-3F25-41EA-8D57-8A40F314C54B}"/>
+              </a:ext>
+            </a:extLst>
+          </p:cNvPr>
+          <p:cNvSpPr/>
+          <p:nvPr/>
+        </p:nvSpPr>
+        <p:spPr>
+          <a:xfrm>
+            <a:off x="5525166" y="3574532"/>
+            <a:ext cx="36000" cy="36000"/>
+          </a:xfrm>
+          <a:prstGeom prst="ellipse">
+            <a:avLst/>
+          </a:prstGeom>
+          <a:solidFill>
+            <a:srgbClr val="D95319"/>
+          </a:solidFill>
+          <a:ln>
+            <a:noFill/>
+          </a:ln>
+        </p:spPr>
+        <p:style>
+          <a:lnRef idx="2">
+            <a:schemeClr val="accent1">
+              <a:shade val="50000"/>
+            </a:schemeClr>
+          </a:lnRef>
+          <a:fillRef idx="1">
+            <a:schemeClr val="accent1"/>
+          </a:fillRef>
+          <a:effectRef idx="0">
+            <a:schemeClr val="accent1"/>
+          </a:effectRef>
+          <a:fontRef idx="minor">
+            <a:schemeClr val="lt1"/>
+          </a:fontRef>
+        </p:style>
+        <p:txBody>
+          <a:bodyPr rtlCol="0" anchor="ctr"/>
+          <a:lstStyle/>
+          <a:p>
+            <a:pPr algn="ctr"/>
+            <a:endParaRPr lang="en-GB"/>
+          </a:p>
+        </p:txBody>
+      </p:sp>
+      <p:cxnSp>
+        <p:nvCxnSpPr>
+          <p:cNvPr id="116" name="Connettore diritto 115">
+            <a:extLst>
+              <a:ext uri="{FF2B5EF4-FFF2-40B4-BE49-F238E27FC236}">
+                <a16:creationId xmlns:a16="http://schemas.microsoft.com/office/drawing/2014/main" id="{708F28DA-97E3-4C3C-93D7-DCF4438C20FF}"/>
+              </a:ext>
+            </a:extLst>
+          </p:cNvPr>
+          <p:cNvCxnSpPr/>
+          <p:nvPr/>
+        </p:nvCxnSpPr>
+        <p:spPr>
+          <a:xfrm>
+            <a:off x="5560504" y="5062893"/>
+            <a:ext cx="0" cy="252000"/>
+          </a:xfrm>
+          <a:prstGeom prst="line">
+            <a:avLst/>
+          </a:prstGeom>
+          <a:ln>
+            <a:solidFill>
+              <a:schemeClr val="bg2">
+                <a:lumMod val="75000"/>
+              </a:schemeClr>
+            </a:solidFill>
+          </a:ln>
+        </p:spPr>
+        <p:style>
+          <a:lnRef idx="1">
+            <a:schemeClr val="accent1"/>
+          </a:lnRef>
+          <a:fillRef idx="0">
+            <a:schemeClr val="accent1"/>
+          </a:fillRef>
+          <a:effectRef idx="0">
+            <a:schemeClr val="accent1"/>
+          </a:effectRef>
+          <a:fontRef idx="minor">
+            <a:schemeClr val="tx1"/>
+          </a:fontRef>
+        </p:style>
+      </p:cxnSp>
+      <p:sp>
+        <p:nvSpPr>
+          <p:cNvPr id="117" name="Ovale 116">
+            <a:extLst>
+              <a:ext uri="{FF2B5EF4-FFF2-40B4-BE49-F238E27FC236}">
+                <a16:creationId xmlns:a16="http://schemas.microsoft.com/office/drawing/2014/main" id="{A690ED56-8DD1-4CBC-B01A-E113250B74B3}"/>
+              </a:ext>
+            </a:extLst>
+          </p:cNvPr>
+          <p:cNvSpPr/>
+          <p:nvPr/>
+        </p:nvSpPr>
+        <p:spPr>
+          <a:xfrm>
+            <a:off x="5542835" y="5295607"/>
+            <a:ext cx="36000" cy="36000"/>
+          </a:xfrm>
+          <a:prstGeom prst="ellipse">
+            <a:avLst/>
+          </a:prstGeom>
+          <a:solidFill>
+            <a:srgbClr val="D95319"/>
+          </a:solidFill>
+          <a:ln>
+            <a:noFill/>
+          </a:ln>
+        </p:spPr>
+        <p:style>
+          <a:lnRef idx="2">
+            <a:schemeClr val="accent1">
+              <a:shade val="50000"/>
+            </a:schemeClr>
+          </a:lnRef>
+          <a:fillRef idx="1">
+            <a:schemeClr val="accent1"/>
+          </a:fillRef>
+          <a:effectRef idx="0">
+            <a:schemeClr val="accent1"/>
+          </a:effectRef>
+          <a:fontRef idx="minor">
+            <a:schemeClr val="lt1"/>
+          </a:fontRef>
+        </p:style>
+        <p:txBody>
+          <a:bodyPr rtlCol="0" anchor="ctr"/>
+          <a:lstStyle/>
+          <a:p>
+            <a:pPr algn="ctr"/>
+            <a:endParaRPr lang="en-GB"/>
+          </a:p>
+        </p:txBody>
+      </p:sp>
+      <p:cxnSp>
+        <p:nvCxnSpPr>
+          <p:cNvPr id="118" name="Connettore diritto 117">
+            <a:extLst>
+              <a:ext uri="{FF2B5EF4-FFF2-40B4-BE49-F238E27FC236}">
+                <a16:creationId xmlns:a16="http://schemas.microsoft.com/office/drawing/2014/main" id="{E52E8D97-F4E6-494B-AEFF-F239D930F3F3}"/>
+              </a:ext>
+            </a:extLst>
+          </p:cNvPr>
+          <p:cNvCxnSpPr/>
+          <p:nvPr/>
+        </p:nvCxnSpPr>
+        <p:spPr>
+          <a:xfrm>
+            <a:off x="1893009" y="3340411"/>
+            <a:ext cx="0" cy="252000"/>
+          </a:xfrm>
+          <a:prstGeom prst="line">
+            <a:avLst/>
+          </a:prstGeom>
+          <a:ln>
+            <a:solidFill>
+              <a:schemeClr val="bg2">
+                <a:lumMod val="75000"/>
+              </a:schemeClr>
+            </a:solidFill>
+          </a:ln>
+        </p:spPr>
+        <p:style>
+          <a:lnRef idx="1">
+            <a:schemeClr val="accent1"/>
+          </a:lnRef>
+          <a:fillRef idx="0">
+            <a:schemeClr val="accent1"/>
+          </a:fillRef>
+          <a:effectRef idx="0">
+            <a:schemeClr val="accent1"/>
+          </a:effectRef>
+          <a:fontRef idx="minor">
+            <a:schemeClr val="tx1"/>
+          </a:fontRef>
+        </p:style>
+      </p:cxnSp>
+      <p:sp>
+        <p:nvSpPr>
+          <p:cNvPr id="119" name="Ovale 118">
+            <a:extLst>
+              <a:ext uri="{FF2B5EF4-FFF2-40B4-BE49-F238E27FC236}">
+                <a16:creationId xmlns:a16="http://schemas.microsoft.com/office/drawing/2014/main" id="{CCB53309-59A9-49D4-B5F2-FBD5AF84B07B}"/>
+              </a:ext>
+            </a:extLst>
+          </p:cNvPr>
+          <p:cNvSpPr/>
+          <p:nvPr/>
+        </p:nvSpPr>
+        <p:spPr>
+          <a:xfrm>
+            <a:off x="1877716" y="3573125"/>
+            <a:ext cx="36000" cy="36000"/>
+          </a:xfrm>
+          <a:prstGeom prst="ellipse">
+            <a:avLst/>
+          </a:prstGeom>
+          <a:solidFill>
+            <a:srgbClr val="7E2F8E"/>
+          </a:solidFill>
+          <a:ln>
+            <a:noFill/>
+          </a:ln>
+        </p:spPr>
+        <p:style>
+          <a:lnRef idx="2">
+            <a:schemeClr val="accent1">
+              <a:shade val="50000"/>
+            </a:schemeClr>
+          </a:lnRef>
+          <a:fillRef idx="1">
+            <a:schemeClr val="accent1"/>
+          </a:fillRef>
+          <a:effectRef idx="0">
+            <a:schemeClr val="accent1"/>
+          </a:effectRef>
+          <a:fontRef idx="minor">
+            <a:schemeClr val="lt1"/>
+          </a:fontRef>
+        </p:style>
+        <p:txBody>
+          <a:bodyPr rtlCol="0" anchor="ctr"/>
+          <a:lstStyle/>
+          <a:p>
+            <a:pPr algn="ctr"/>
+            <a:endParaRPr lang="en-GB"/>
+          </a:p>
+        </p:txBody>
+      </p:sp>
+      <p:cxnSp>
+        <p:nvCxnSpPr>
+          <p:cNvPr id="120" name="Connettore diritto 119">
+            <a:extLst>
+              <a:ext uri="{FF2B5EF4-FFF2-40B4-BE49-F238E27FC236}">
+                <a16:creationId xmlns:a16="http://schemas.microsoft.com/office/drawing/2014/main" id="{D7A53FD3-3BC8-4265-8A6B-F2C112E21D8A}"/>
+              </a:ext>
+            </a:extLst>
+          </p:cNvPr>
+          <p:cNvCxnSpPr/>
+          <p:nvPr/>
+        </p:nvCxnSpPr>
+        <p:spPr>
+          <a:xfrm>
+            <a:off x="1886277" y="5062893"/>
+            <a:ext cx="0" cy="252000"/>
+          </a:xfrm>
+          <a:prstGeom prst="line">
+            <a:avLst/>
+          </a:prstGeom>
+          <a:ln>
+            <a:solidFill>
+              <a:schemeClr val="bg2">
+                <a:lumMod val="75000"/>
+              </a:schemeClr>
+            </a:solidFill>
+          </a:ln>
+        </p:spPr>
+        <p:style>
+          <a:lnRef idx="1">
+            <a:schemeClr val="accent1"/>
+          </a:lnRef>
+          <a:fillRef idx="0">
+            <a:schemeClr val="accent1"/>
+          </a:fillRef>
+          <a:effectRef idx="0">
+            <a:schemeClr val="accent1"/>
+          </a:effectRef>
+          <a:fontRef idx="minor">
+            <a:schemeClr val="tx1"/>
+          </a:fontRef>
+        </p:style>
+      </p:cxnSp>
+      <p:sp>
+        <p:nvSpPr>
+          <p:cNvPr id="121" name="Ovale 120">
+            <a:extLst>
+              <a:ext uri="{FF2B5EF4-FFF2-40B4-BE49-F238E27FC236}">
+                <a16:creationId xmlns:a16="http://schemas.microsoft.com/office/drawing/2014/main" id="{D98D5718-99F8-44AE-81DE-0499B9116A49}"/>
+              </a:ext>
+            </a:extLst>
+          </p:cNvPr>
+          <p:cNvSpPr/>
+          <p:nvPr/>
+        </p:nvSpPr>
+        <p:spPr>
+          <a:xfrm>
+            <a:off x="1870984" y="5295607"/>
+            <a:ext cx="36000" cy="36000"/>
+          </a:xfrm>
+          <a:prstGeom prst="ellipse">
+            <a:avLst/>
+          </a:prstGeom>
+          <a:solidFill>
+            <a:srgbClr val="7E2F8E"/>
+          </a:solidFill>
+          <a:ln>
+            <a:noFill/>
+          </a:ln>
+        </p:spPr>
+        <p:style>
+          <a:lnRef idx="2">
+            <a:schemeClr val="accent1">
+              <a:shade val="50000"/>
+            </a:schemeClr>
+          </a:lnRef>
+          <a:fillRef idx="1">
+            <a:schemeClr val="accent1"/>
+          </a:fillRef>
+          <a:effectRef idx="0">
+            <a:schemeClr val="accent1"/>
+          </a:effectRef>
+          <a:fontRef idx="minor">
+            <a:schemeClr val="lt1"/>
+          </a:fontRef>
+        </p:style>
+        <p:txBody>
+          <a:bodyPr rtlCol="0" anchor="ctr"/>
+          <a:lstStyle/>
+          <a:p>
+            <a:pPr algn="ctr"/>
+            <a:endParaRPr lang="en-GB"/>
+          </a:p>
+        </p:txBody>
+      </p:sp>
+      <p:cxnSp>
+        <p:nvCxnSpPr>
+          <p:cNvPr id="122" name="Connettore diritto 121">
+            <a:extLst>
+              <a:ext uri="{FF2B5EF4-FFF2-40B4-BE49-F238E27FC236}">
+                <a16:creationId xmlns:a16="http://schemas.microsoft.com/office/drawing/2014/main" id="{206B403A-F48B-434A-864D-7E700A7CC165}"/>
+              </a:ext>
+            </a:extLst>
+          </p:cNvPr>
+          <p:cNvCxnSpPr/>
+          <p:nvPr/>
+        </p:nvCxnSpPr>
+        <p:spPr>
+          <a:xfrm>
+            <a:off x="5271937" y="1620977"/>
+            <a:ext cx="0" cy="252000"/>
+          </a:xfrm>
+          <a:prstGeom prst="line">
+            <a:avLst/>
+          </a:prstGeom>
+          <a:ln>
+            <a:solidFill>
+              <a:schemeClr val="bg2">
+                <a:lumMod val="75000"/>
+              </a:schemeClr>
+            </a:solidFill>
+          </a:ln>
+        </p:spPr>
+        <p:style>
+          <a:lnRef idx="1">
+            <a:schemeClr val="accent1"/>
+          </a:lnRef>
+          <a:fillRef idx="0">
+            <a:schemeClr val="accent1"/>
+          </a:fillRef>
+          <a:effectRef idx="0">
+            <a:schemeClr val="accent1"/>
+          </a:effectRef>
+          <a:fontRef idx="minor">
+            <a:schemeClr val="tx1"/>
+          </a:fontRef>
+        </p:style>
+      </p:cxnSp>
+      <p:sp>
+        <p:nvSpPr>
+          <p:cNvPr id="123" name="Ovale 122">
+            <a:extLst>
+              <a:ext uri="{FF2B5EF4-FFF2-40B4-BE49-F238E27FC236}">
+                <a16:creationId xmlns:a16="http://schemas.microsoft.com/office/drawing/2014/main" id="{23B115A7-D3EE-4F0F-96F1-83E270E0E3B9}"/>
+              </a:ext>
+            </a:extLst>
+          </p:cNvPr>
+          <p:cNvSpPr/>
+          <p:nvPr/>
+        </p:nvSpPr>
+        <p:spPr>
+          <a:xfrm>
+            <a:off x="5256644" y="1853691"/>
+            <a:ext cx="36000" cy="36000"/>
+          </a:xfrm>
+          <a:prstGeom prst="ellipse">
+            <a:avLst/>
+          </a:prstGeom>
+          <a:solidFill>
+            <a:srgbClr val="7E2F8E"/>
+          </a:solidFill>
+          <a:ln>
+            <a:noFill/>
+          </a:ln>
+        </p:spPr>
+        <p:style>
+          <a:lnRef idx="2">
+            <a:schemeClr val="accent1">
+              <a:shade val="50000"/>
+            </a:schemeClr>
+          </a:lnRef>
+          <a:fillRef idx="1">
+            <a:schemeClr val="accent1"/>
+          </a:fillRef>
+          <a:effectRef idx="0">
+            <a:schemeClr val="accent1"/>
+          </a:effectRef>
+          <a:fontRef idx="minor">
+            <a:schemeClr val="lt1"/>
+          </a:fontRef>
+        </p:style>
+        <p:txBody>
+          <a:bodyPr rtlCol="0" anchor="ctr"/>
+          <a:lstStyle/>
+          <a:p>
+            <a:pPr algn="ctr"/>
+            <a:endParaRPr lang="en-GB"/>
+          </a:p>
+        </p:txBody>
+      </p:sp>
+      <p:cxnSp>
+        <p:nvCxnSpPr>
+          <p:cNvPr id="124" name="Connettore diritto 123">
+            <a:extLst>
+              <a:ext uri="{FF2B5EF4-FFF2-40B4-BE49-F238E27FC236}">
+                <a16:creationId xmlns:a16="http://schemas.microsoft.com/office/drawing/2014/main" id="{9C7EA058-4F07-4C77-814A-181A3B224800}"/>
+              </a:ext>
+            </a:extLst>
+          </p:cNvPr>
+          <p:cNvCxnSpPr/>
+          <p:nvPr/>
+        </p:nvCxnSpPr>
+        <p:spPr>
+          <a:xfrm>
+            <a:off x="5268460" y="3341818"/>
+            <a:ext cx="0" cy="252000"/>
+          </a:xfrm>
+          <a:prstGeom prst="line">
+            <a:avLst/>
+          </a:prstGeom>
+          <a:ln>
+            <a:solidFill>
+              <a:schemeClr val="bg2">
+                <a:lumMod val="75000"/>
+              </a:schemeClr>
+            </a:solidFill>
+          </a:ln>
+        </p:spPr>
+        <p:style>
+          <a:lnRef idx="1">
+            <a:schemeClr val="accent1"/>
+          </a:lnRef>
+          <a:fillRef idx="0">
+            <a:schemeClr val="accent1"/>
+          </a:fillRef>
+          <a:effectRef idx="0">
+            <a:schemeClr val="accent1"/>
+          </a:effectRef>
+          <a:fontRef idx="minor">
+            <a:schemeClr val="tx1"/>
+          </a:fontRef>
+        </p:style>
+      </p:cxnSp>
+      <p:sp>
+        <p:nvSpPr>
+          <p:cNvPr id="127" name="Ovale 126">
+            <a:extLst>
+              <a:ext uri="{FF2B5EF4-FFF2-40B4-BE49-F238E27FC236}">
+                <a16:creationId xmlns:a16="http://schemas.microsoft.com/office/drawing/2014/main" id="{57663907-7F4C-4F7A-9FCD-A7512037A3C2}"/>
+              </a:ext>
+            </a:extLst>
+          </p:cNvPr>
+          <p:cNvSpPr/>
+          <p:nvPr/>
+        </p:nvSpPr>
+        <p:spPr>
+          <a:xfrm>
+            <a:off x="5253167" y="3574532"/>
+            <a:ext cx="36000" cy="36000"/>
+          </a:xfrm>
+          <a:prstGeom prst="ellipse">
+            <a:avLst/>
+          </a:prstGeom>
+          <a:solidFill>
+            <a:srgbClr val="7E2F8E"/>
+          </a:solidFill>
+          <a:ln>
+            <a:noFill/>
+          </a:ln>
+        </p:spPr>
+        <p:style>
+          <a:lnRef idx="2">
+            <a:schemeClr val="accent1">
+              <a:shade val="50000"/>
+            </a:schemeClr>
+          </a:lnRef>
+          <a:fillRef idx="1">
+            <a:schemeClr val="accent1"/>
+          </a:fillRef>
+          <a:effectRef idx="0">
+            <a:schemeClr val="accent1"/>
+          </a:effectRef>
+          <a:fontRef idx="minor">
+            <a:schemeClr val="lt1"/>
+          </a:fontRef>
+        </p:style>
+        <p:txBody>
+          <a:bodyPr rtlCol="0" anchor="ctr"/>
+          <a:lstStyle/>
+          <a:p>
+            <a:pPr algn="ctr"/>
+            <a:endParaRPr lang="en-GB"/>
+          </a:p>
+        </p:txBody>
+      </p:sp>
+      <p:cxnSp>
+        <p:nvCxnSpPr>
+          <p:cNvPr id="138" name="Connettore diritto 137">
+            <a:extLst>
+              <a:ext uri="{FF2B5EF4-FFF2-40B4-BE49-F238E27FC236}">
+                <a16:creationId xmlns:a16="http://schemas.microsoft.com/office/drawing/2014/main" id="{1BD3398A-8D4B-47DF-B3A1-F38710444138}"/>
+              </a:ext>
+            </a:extLst>
+          </p:cNvPr>
+          <p:cNvCxnSpPr/>
+          <p:nvPr/>
+        </p:nvCxnSpPr>
+        <p:spPr>
+          <a:xfrm>
+            <a:off x="5271872" y="5062893"/>
+            <a:ext cx="0" cy="252000"/>
+          </a:xfrm>
+          <a:prstGeom prst="line">
+            <a:avLst/>
+          </a:prstGeom>
+          <a:ln>
+            <a:solidFill>
+              <a:schemeClr val="bg2">
+                <a:lumMod val="75000"/>
+              </a:schemeClr>
+            </a:solidFill>
+          </a:ln>
+        </p:spPr>
+        <p:style>
+          <a:lnRef idx="1">
+            <a:schemeClr val="accent1"/>
+          </a:lnRef>
+          <a:fillRef idx="0">
+            <a:schemeClr val="accent1"/>
+          </a:fillRef>
+          <a:effectRef idx="0">
+            <a:schemeClr val="accent1"/>
+          </a:effectRef>
+          <a:fontRef idx="minor">
+            <a:schemeClr val="tx1"/>
+          </a:fontRef>
+        </p:style>
+      </p:cxnSp>
+      <p:sp>
+        <p:nvSpPr>
+          <p:cNvPr id="139" name="Ovale 138">
+            <a:extLst>
+              <a:ext uri="{FF2B5EF4-FFF2-40B4-BE49-F238E27FC236}">
+                <a16:creationId xmlns:a16="http://schemas.microsoft.com/office/drawing/2014/main" id="{18077344-B0C5-4D88-BBE9-314749A1586B}"/>
+              </a:ext>
+            </a:extLst>
+          </p:cNvPr>
+          <p:cNvSpPr/>
+          <p:nvPr/>
+        </p:nvSpPr>
+        <p:spPr>
+          <a:xfrm>
+            <a:off x="5256579" y="5295607"/>
+            <a:ext cx="36000" cy="36000"/>
+          </a:xfrm>
+          <a:prstGeom prst="ellipse">
+            <a:avLst/>
+          </a:prstGeom>
+          <a:solidFill>
+            <a:srgbClr val="7E2F8E"/>
+          </a:solidFill>
+          <a:ln>
+            <a:noFill/>
+          </a:ln>
+        </p:spPr>
+        <p:style>
+          <a:lnRef idx="2">
+            <a:schemeClr val="accent1">
+              <a:shade val="50000"/>
+            </a:schemeClr>
+          </a:lnRef>
+          <a:fillRef idx="1">
+            <a:schemeClr val="accent1"/>
+          </a:fillRef>
+          <a:effectRef idx="0">
+            <a:schemeClr val="accent1"/>
+          </a:effectRef>
+          <a:fontRef idx="minor">
+            <a:schemeClr val="lt1"/>
+          </a:fontRef>
+        </p:style>
+        <p:txBody>
+          <a:bodyPr rtlCol="0" anchor="ctr"/>
+          <a:lstStyle/>
+          <a:p>
+            <a:pPr algn="ctr"/>
+            <a:endParaRPr lang="en-GB"/>
           </a:p>
         </p:txBody>
       </p:sp>

</xml_diff>